<commit_message>
loops lection is done
</commit_message>
<xml_diff>
--- a/JS Fundamentals/4.Loops/JS-Loops.pptx
+++ b/JS Fundamentals/4.Loops/JS-Loops.pptx
@@ -4,14 +4,24 @@
   <p:sldMasterIdLst>
     <p:sldMasterId id="2147484157" r:id="rId1"/>
   </p:sldMasterIdLst>
+  <p:notesMasterIdLst>
+    <p:notesMasterId r:id="rId16"/>
+  </p:notesMasterIdLst>
   <p:sldIdLst>
     <p:sldId id="256" r:id="rId2"/>
     <p:sldId id="267" r:id="rId3"/>
     <p:sldId id="279" r:id="rId4"/>
     <p:sldId id="280" r:id="rId5"/>
     <p:sldId id="281" r:id="rId6"/>
-    <p:sldId id="266" r:id="rId7"/>
-    <p:sldId id="278" r:id="rId8"/>
+    <p:sldId id="282" r:id="rId7"/>
+    <p:sldId id="283" r:id="rId8"/>
+    <p:sldId id="284" r:id="rId9"/>
+    <p:sldId id="285" r:id="rId10"/>
+    <p:sldId id="286" r:id="rId11"/>
+    <p:sldId id="287" r:id="rId12"/>
+    <p:sldId id="288" r:id="rId13"/>
+    <p:sldId id="266" r:id="rId14"/>
+    <p:sldId id="278" r:id="rId15"/>
   </p:sldIdLst>
   <p:sldSz cx="12192000" cy="6858000"/>
   <p:notesSz cx="6858000" cy="9144000"/>
@@ -116,6 +126,440 @@
     </p:ext>
   </p:extLst>
 </p:presentation>
+</file>
+
+<file path=ppt/notesMasters/notesMaster1.xml><?xml version="1.0" encoding="utf-8"?>
+<p:notesMaster xmlns:a="http://schemas.openxmlformats.org/drawingml/2006/main" xmlns:r="http://schemas.openxmlformats.org/officeDocument/2006/relationships" xmlns:p="http://schemas.openxmlformats.org/presentationml/2006/main">
+  <p:cSld>
+    <p:bg>
+      <p:bgRef idx="1001">
+        <a:schemeClr val="bg1"/>
+      </p:bgRef>
+    </p:bg>
+    <p:spTree>
+      <p:nvGrpSpPr>
+        <p:cNvPr id="1" name=""/>
+        <p:cNvGrpSpPr/>
+        <p:nvPr/>
+      </p:nvGrpSpPr>
+      <p:grpSpPr>
+        <a:xfrm>
+          <a:off x="0" y="0"/>
+          <a:ext cx="0" cy="0"/>
+          <a:chOff x="0" y="0"/>
+          <a:chExt cx="0" cy="0"/>
+        </a:xfrm>
+      </p:grpSpPr>
+      <p:sp>
+        <p:nvSpPr>
+          <p:cNvPr id="2" name="Header Placeholder 1"/>
+          <p:cNvSpPr>
+            <a:spLocks noGrp="1"/>
+          </p:cNvSpPr>
+          <p:nvPr>
+            <p:ph type="hdr" sz="quarter"/>
+          </p:nvPr>
+        </p:nvSpPr>
+        <p:spPr>
+          <a:xfrm>
+            <a:off x="0" y="0"/>
+            <a:ext cx="2971800" cy="458788"/>
+          </a:xfrm>
+          <a:prstGeom prst="rect">
+            <a:avLst/>
+          </a:prstGeom>
+        </p:spPr>
+        <p:txBody>
+          <a:bodyPr vert="horz" lIns="91440" tIns="45720" rIns="91440" bIns="45720" rtlCol="0"/>
+          <a:lstStyle>
+            <a:lvl1pPr algn="l">
+              <a:defRPr sz="1200"/>
+            </a:lvl1pPr>
+          </a:lstStyle>
+          <a:p>
+            <a:endParaRPr lang="en-US"/>
+          </a:p>
+        </p:txBody>
+      </p:sp>
+      <p:sp>
+        <p:nvSpPr>
+          <p:cNvPr id="3" name="Date Placeholder 2"/>
+          <p:cNvSpPr>
+            <a:spLocks noGrp="1"/>
+          </p:cNvSpPr>
+          <p:nvPr>
+            <p:ph type="dt" idx="1"/>
+          </p:nvPr>
+        </p:nvSpPr>
+        <p:spPr>
+          <a:xfrm>
+            <a:off x="3884613" y="0"/>
+            <a:ext cx="2971800" cy="458788"/>
+          </a:xfrm>
+          <a:prstGeom prst="rect">
+            <a:avLst/>
+          </a:prstGeom>
+        </p:spPr>
+        <p:txBody>
+          <a:bodyPr vert="horz" lIns="91440" tIns="45720" rIns="91440" bIns="45720" rtlCol="0"/>
+          <a:lstStyle>
+            <a:lvl1pPr algn="r">
+              <a:defRPr sz="1200"/>
+            </a:lvl1pPr>
+          </a:lstStyle>
+          <a:p>
+            <a:fld id="{F6A950C5-F15E-44EA-AF6A-22227443235C}" type="datetimeFigureOut">
+              <a:rPr lang="en-US" smtClean="0"/>
+              <a:t>11-Apr-16</a:t>
+            </a:fld>
+            <a:endParaRPr lang="en-US"/>
+          </a:p>
+        </p:txBody>
+      </p:sp>
+      <p:sp>
+        <p:nvSpPr>
+          <p:cNvPr id="4" name="Slide Image Placeholder 3"/>
+          <p:cNvSpPr>
+            <a:spLocks noGrp="1" noRot="1" noChangeAspect="1"/>
+          </p:cNvSpPr>
+          <p:nvPr>
+            <p:ph type="sldImg" idx="2"/>
+          </p:nvPr>
+        </p:nvSpPr>
+        <p:spPr>
+          <a:xfrm>
+            <a:off x="685800" y="1143000"/>
+            <a:ext cx="5486400" cy="3086100"/>
+          </a:xfrm>
+          <a:prstGeom prst="rect">
+            <a:avLst/>
+          </a:prstGeom>
+          <a:noFill/>
+          <a:ln w="12700">
+            <a:solidFill>
+              <a:prstClr val="black"/>
+            </a:solidFill>
+          </a:ln>
+        </p:spPr>
+        <p:txBody>
+          <a:bodyPr vert="horz" lIns="91440" tIns="45720" rIns="91440" bIns="45720" rtlCol="0" anchor="ctr"/>
+          <a:lstStyle/>
+          <a:p>
+            <a:endParaRPr lang="en-US"/>
+          </a:p>
+        </p:txBody>
+      </p:sp>
+      <p:sp>
+        <p:nvSpPr>
+          <p:cNvPr id="5" name="Notes Placeholder 4"/>
+          <p:cNvSpPr>
+            <a:spLocks noGrp="1"/>
+          </p:cNvSpPr>
+          <p:nvPr>
+            <p:ph type="body" sz="quarter" idx="3"/>
+          </p:nvPr>
+        </p:nvSpPr>
+        <p:spPr>
+          <a:xfrm>
+            <a:off x="685800" y="4400550"/>
+            <a:ext cx="5486400" cy="3600450"/>
+          </a:xfrm>
+          <a:prstGeom prst="rect">
+            <a:avLst/>
+          </a:prstGeom>
+        </p:spPr>
+        <p:txBody>
+          <a:bodyPr vert="horz" lIns="91440" tIns="45720" rIns="91440" bIns="45720" rtlCol="0"/>
+          <a:lstStyle/>
+          <a:p>
+            <a:pPr lvl="0"/>
+            <a:r>
+              <a:rPr lang="en-US" smtClean="0"/>
+              <a:t>Click to edit Master text styles</a:t>
+            </a:r>
+          </a:p>
+          <a:p>
+            <a:pPr lvl="1"/>
+            <a:r>
+              <a:rPr lang="en-US" smtClean="0"/>
+              <a:t>Second level</a:t>
+            </a:r>
+          </a:p>
+          <a:p>
+            <a:pPr lvl="2"/>
+            <a:r>
+              <a:rPr lang="en-US" smtClean="0"/>
+              <a:t>Third level</a:t>
+            </a:r>
+          </a:p>
+          <a:p>
+            <a:pPr lvl="3"/>
+            <a:r>
+              <a:rPr lang="en-US" smtClean="0"/>
+              <a:t>Fourth level</a:t>
+            </a:r>
+          </a:p>
+          <a:p>
+            <a:pPr lvl="4"/>
+            <a:r>
+              <a:rPr lang="en-US" smtClean="0"/>
+              <a:t>Fifth level</a:t>
+            </a:r>
+            <a:endParaRPr lang="en-US"/>
+          </a:p>
+        </p:txBody>
+      </p:sp>
+      <p:sp>
+        <p:nvSpPr>
+          <p:cNvPr id="6" name="Footer Placeholder 5"/>
+          <p:cNvSpPr>
+            <a:spLocks noGrp="1"/>
+          </p:cNvSpPr>
+          <p:nvPr>
+            <p:ph type="ftr" sz="quarter" idx="4"/>
+          </p:nvPr>
+        </p:nvSpPr>
+        <p:spPr>
+          <a:xfrm>
+            <a:off x="0" y="8685213"/>
+            <a:ext cx="2971800" cy="458787"/>
+          </a:xfrm>
+          <a:prstGeom prst="rect">
+            <a:avLst/>
+          </a:prstGeom>
+        </p:spPr>
+        <p:txBody>
+          <a:bodyPr vert="horz" lIns="91440" tIns="45720" rIns="91440" bIns="45720" rtlCol="0" anchor="b"/>
+          <a:lstStyle>
+            <a:lvl1pPr algn="l">
+              <a:defRPr sz="1200"/>
+            </a:lvl1pPr>
+          </a:lstStyle>
+          <a:p>
+            <a:endParaRPr lang="en-US"/>
+          </a:p>
+        </p:txBody>
+      </p:sp>
+      <p:sp>
+        <p:nvSpPr>
+          <p:cNvPr id="7" name="Slide Number Placeholder 6"/>
+          <p:cNvSpPr>
+            <a:spLocks noGrp="1"/>
+          </p:cNvSpPr>
+          <p:nvPr>
+            <p:ph type="sldNum" sz="quarter" idx="5"/>
+          </p:nvPr>
+        </p:nvSpPr>
+        <p:spPr>
+          <a:xfrm>
+            <a:off x="3884613" y="8685213"/>
+            <a:ext cx="2971800" cy="458787"/>
+          </a:xfrm>
+          <a:prstGeom prst="rect">
+            <a:avLst/>
+          </a:prstGeom>
+        </p:spPr>
+        <p:txBody>
+          <a:bodyPr vert="horz" lIns="91440" tIns="45720" rIns="91440" bIns="45720" rtlCol="0" anchor="b"/>
+          <a:lstStyle>
+            <a:lvl1pPr algn="r">
+              <a:defRPr sz="1200"/>
+            </a:lvl1pPr>
+          </a:lstStyle>
+          <a:p>
+            <a:fld id="{D37408E3-6231-4987-ABA7-519437102D8B}" type="slidenum">
+              <a:rPr lang="en-US" smtClean="0"/>
+              <a:t>‹#›</a:t>
+            </a:fld>
+            <a:endParaRPr lang="en-US"/>
+          </a:p>
+        </p:txBody>
+      </p:sp>
+    </p:spTree>
+    <p:extLst>
+      <p:ext uri="{BB962C8B-B14F-4D97-AF65-F5344CB8AC3E}">
+        <p14:creationId xmlns:p14="http://schemas.microsoft.com/office/powerpoint/2010/main" val="4221014722"/>
+      </p:ext>
+    </p:extLst>
+  </p:cSld>
+  <p:clrMap bg1="lt1" tx1="dk1" bg2="lt2" tx2="dk2" accent1="accent1" accent2="accent2" accent3="accent3" accent4="accent4" accent5="accent5" accent6="accent6" hlink="hlink" folHlink="folHlink"/>
+  <p:notesStyle>
+    <a:lvl1pPr marL="0" algn="l" defTabSz="914400" rtl="0" eaLnBrk="1" latinLnBrk="0" hangingPunct="1">
+      <a:defRPr sz="1200" kern="1200">
+        <a:solidFill>
+          <a:schemeClr val="tx1"/>
+        </a:solidFill>
+        <a:latin typeface="+mn-lt"/>
+        <a:ea typeface="+mn-ea"/>
+        <a:cs typeface="+mn-cs"/>
+      </a:defRPr>
+    </a:lvl1pPr>
+    <a:lvl2pPr marL="457200" algn="l" defTabSz="914400" rtl="0" eaLnBrk="1" latinLnBrk="0" hangingPunct="1">
+      <a:defRPr sz="1200" kern="1200">
+        <a:solidFill>
+          <a:schemeClr val="tx1"/>
+        </a:solidFill>
+        <a:latin typeface="+mn-lt"/>
+        <a:ea typeface="+mn-ea"/>
+        <a:cs typeface="+mn-cs"/>
+      </a:defRPr>
+    </a:lvl2pPr>
+    <a:lvl3pPr marL="914400" algn="l" defTabSz="914400" rtl="0" eaLnBrk="1" latinLnBrk="0" hangingPunct="1">
+      <a:defRPr sz="1200" kern="1200">
+        <a:solidFill>
+          <a:schemeClr val="tx1"/>
+        </a:solidFill>
+        <a:latin typeface="+mn-lt"/>
+        <a:ea typeface="+mn-ea"/>
+        <a:cs typeface="+mn-cs"/>
+      </a:defRPr>
+    </a:lvl3pPr>
+    <a:lvl4pPr marL="1371600" algn="l" defTabSz="914400" rtl="0" eaLnBrk="1" latinLnBrk="0" hangingPunct="1">
+      <a:defRPr sz="1200" kern="1200">
+        <a:solidFill>
+          <a:schemeClr val="tx1"/>
+        </a:solidFill>
+        <a:latin typeface="+mn-lt"/>
+        <a:ea typeface="+mn-ea"/>
+        <a:cs typeface="+mn-cs"/>
+      </a:defRPr>
+    </a:lvl4pPr>
+    <a:lvl5pPr marL="1828800" algn="l" defTabSz="914400" rtl="0" eaLnBrk="1" latinLnBrk="0" hangingPunct="1">
+      <a:defRPr sz="1200" kern="1200">
+        <a:solidFill>
+          <a:schemeClr val="tx1"/>
+        </a:solidFill>
+        <a:latin typeface="+mn-lt"/>
+        <a:ea typeface="+mn-ea"/>
+        <a:cs typeface="+mn-cs"/>
+      </a:defRPr>
+    </a:lvl5pPr>
+    <a:lvl6pPr marL="2286000" algn="l" defTabSz="914400" rtl="0" eaLnBrk="1" latinLnBrk="0" hangingPunct="1">
+      <a:defRPr sz="1200" kern="1200">
+        <a:solidFill>
+          <a:schemeClr val="tx1"/>
+        </a:solidFill>
+        <a:latin typeface="+mn-lt"/>
+        <a:ea typeface="+mn-ea"/>
+        <a:cs typeface="+mn-cs"/>
+      </a:defRPr>
+    </a:lvl6pPr>
+    <a:lvl7pPr marL="2743200" algn="l" defTabSz="914400" rtl="0" eaLnBrk="1" latinLnBrk="0" hangingPunct="1">
+      <a:defRPr sz="1200" kern="1200">
+        <a:solidFill>
+          <a:schemeClr val="tx1"/>
+        </a:solidFill>
+        <a:latin typeface="+mn-lt"/>
+        <a:ea typeface="+mn-ea"/>
+        <a:cs typeface="+mn-cs"/>
+      </a:defRPr>
+    </a:lvl7pPr>
+    <a:lvl8pPr marL="3200400" algn="l" defTabSz="914400" rtl="0" eaLnBrk="1" latinLnBrk="0" hangingPunct="1">
+      <a:defRPr sz="1200" kern="1200">
+        <a:solidFill>
+          <a:schemeClr val="tx1"/>
+        </a:solidFill>
+        <a:latin typeface="+mn-lt"/>
+        <a:ea typeface="+mn-ea"/>
+        <a:cs typeface="+mn-cs"/>
+      </a:defRPr>
+    </a:lvl8pPr>
+    <a:lvl9pPr marL="3657600" algn="l" defTabSz="914400" rtl="0" eaLnBrk="1" latinLnBrk="0" hangingPunct="1">
+      <a:defRPr sz="1200" kern="1200">
+        <a:solidFill>
+          <a:schemeClr val="tx1"/>
+        </a:solidFill>
+        <a:latin typeface="+mn-lt"/>
+        <a:ea typeface="+mn-ea"/>
+        <a:cs typeface="+mn-cs"/>
+      </a:defRPr>
+    </a:lvl9pPr>
+  </p:notesStyle>
+</p:notesMaster>
+</file>
+
+<file path=ppt/notesSlides/notesSlide1.xml><?xml version="1.0" encoding="utf-8"?>
+<p:notes xmlns:a="http://schemas.openxmlformats.org/drawingml/2006/main" xmlns:r="http://schemas.openxmlformats.org/officeDocument/2006/relationships" xmlns:p="http://schemas.openxmlformats.org/presentationml/2006/main">
+  <p:cSld>
+    <p:spTree>
+      <p:nvGrpSpPr>
+        <p:cNvPr id="1" name=""/>
+        <p:cNvGrpSpPr/>
+        <p:nvPr/>
+      </p:nvGrpSpPr>
+      <p:grpSpPr>
+        <a:xfrm>
+          <a:off x="0" y="0"/>
+          <a:ext cx="0" cy="0"/>
+          <a:chOff x="0" y="0"/>
+          <a:chExt cx="0" cy="0"/>
+        </a:xfrm>
+      </p:grpSpPr>
+      <p:sp>
+        <p:nvSpPr>
+          <p:cNvPr id="2" name="Slide Image Placeholder 1"/>
+          <p:cNvSpPr>
+            <a:spLocks noGrp="1" noRot="1" noChangeAspect="1"/>
+          </p:cNvSpPr>
+          <p:nvPr>
+            <p:ph type="sldImg"/>
+          </p:nvPr>
+        </p:nvSpPr>
+        <p:spPr/>
+      </p:sp>
+      <p:sp>
+        <p:nvSpPr>
+          <p:cNvPr id="3" name="Notes Placeholder 2"/>
+          <p:cNvSpPr>
+            <a:spLocks noGrp="1"/>
+          </p:cNvSpPr>
+          <p:nvPr>
+            <p:ph type="body" idx="1"/>
+          </p:nvPr>
+        </p:nvSpPr>
+        <p:spPr/>
+        <p:txBody>
+          <a:bodyPr/>
+          <a:lstStyle/>
+          <a:p>
+            <a:endParaRPr lang="en-US" dirty="0"/>
+          </a:p>
+        </p:txBody>
+      </p:sp>
+      <p:sp>
+        <p:nvSpPr>
+          <p:cNvPr id="4" name="Slide Number Placeholder 3"/>
+          <p:cNvSpPr>
+            <a:spLocks noGrp="1"/>
+          </p:cNvSpPr>
+          <p:nvPr>
+            <p:ph type="sldNum" sz="quarter" idx="10"/>
+          </p:nvPr>
+        </p:nvSpPr>
+        <p:spPr/>
+        <p:txBody>
+          <a:bodyPr/>
+          <a:lstStyle/>
+          <a:p>
+            <a:fld id="{D37408E3-6231-4987-ABA7-519437102D8B}" type="slidenum">
+              <a:rPr lang="en-US" smtClean="0"/>
+              <a:t>10</a:t>
+            </a:fld>
+            <a:endParaRPr lang="en-US"/>
+          </a:p>
+        </p:txBody>
+      </p:sp>
+    </p:spTree>
+    <p:extLst>
+      <p:ext uri="{BB962C8B-B14F-4D97-AF65-F5344CB8AC3E}">
+        <p14:creationId xmlns:p14="http://schemas.microsoft.com/office/powerpoint/2010/main" val="1898269531"/>
+      </p:ext>
+    </p:extLst>
+  </p:cSld>
+  <p:clrMapOvr>
+    <a:masterClrMapping/>
+  </p:clrMapOvr>
+</p:notes>
 </file>
 
 <file path=ppt/slideLayouts/slideLayout1.xml><?xml version="1.0" encoding="utf-8"?>
@@ -620,7 +1064,7 @@
           <a:p>
             <a:fld id="{6F66794D-9D79-4AC5-96DA-597EA4BF2704}" type="datetimeFigureOut">
               <a:rPr lang="en-US" smtClean="0"/>
-              <a:t>04-Apr-16</a:t>
+              <a:t>11-Apr-16</a:t>
             </a:fld>
             <a:endParaRPr lang="en-US"/>
           </a:p>
@@ -953,7 +1397,7 @@
           <a:p>
             <a:fld id="{6F66794D-9D79-4AC5-96DA-597EA4BF2704}" type="datetimeFigureOut">
               <a:rPr lang="en-US" smtClean="0"/>
-              <a:t>04-Apr-16</a:t>
+              <a:t>11-Apr-16</a:t>
             </a:fld>
             <a:endParaRPr lang="en-US"/>
           </a:p>
@@ -1201,7 +1645,7 @@
           <a:p>
             <a:fld id="{6F66794D-9D79-4AC5-96DA-597EA4BF2704}" type="datetimeFigureOut">
               <a:rPr lang="en-US" smtClean="0"/>
-              <a:t>04-Apr-16</a:t>
+              <a:t>11-Apr-16</a:t>
             </a:fld>
             <a:endParaRPr lang="en-US"/>
           </a:p>
@@ -1741,7 +2185,7 @@
           <a:p>
             <a:fld id="{6F66794D-9D79-4AC5-96DA-597EA4BF2704}" type="datetimeFigureOut">
               <a:rPr lang="en-US" smtClean="0"/>
-              <a:t>04-Apr-16</a:t>
+              <a:t>11-Apr-16</a:t>
             </a:fld>
             <a:endParaRPr lang="en-US"/>
           </a:p>
@@ -1989,7 +2433,7 @@
           <a:p>
             <a:fld id="{6F66794D-9D79-4AC5-96DA-597EA4BF2704}" type="datetimeFigureOut">
               <a:rPr lang="en-US" smtClean="0"/>
-              <a:t>04-Apr-16</a:t>
+              <a:t>11-Apr-16</a:t>
             </a:fld>
             <a:endParaRPr lang="en-US"/>
           </a:p>
@@ -2521,7 +2965,7 @@
           <a:p>
             <a:fld id="{6F66794D-9D79-4AC5-96DA-597EA4BF2704}" type="datetimeFigureOut">
               <a:rPr lang="en-US" smtClean="0"/>
-              <a:t>04-Apr-16</a:t>
+              <a:t>11-Apr-16</a:t>
             </a:fld>
             <a:endParaRPr lang="en-US"/>
           </a:p>
@@ -2818,7 +3262,7 @@
           <a:p>
             <a:fld id="{6F66794D-9D79-4AC5-96DA-597EA4BF2704}" type="datetimeFigureOut">
               <a:rPr lang="en-US" smtClean="0"/>
-              <a:t>04-Apr-16</a:t>
+              <a:t>11-Apr-16</a:t>
             </a:fld>
             <a:endParaRPr lang="en-US"/>
           </a:p>
@@ -2992,7 +3436,7 @@
           <a:p>
             <a:fld id="{6F66794D-9D79-4AC5-96DA-597EA4BF2704}" type="datetimeFigureOut">
               <a:rPr lang="en-US" smtClean="0"/>
-              <a:t>04-Apr-16</a:t>
+              <a:t>11-Apr-16</a:t>
             </a:fld>
             <a:endParaRPr lang="en-US"/>
           </a:p>
@@ -3172,7 +3616,7 @@
           <a:p>
             <a:fld id="{6F66794D-9D79-4AC5-96DA-597EA4BF2704}" type="datetimeFigureOut">
               <a:rPr lang="en-US" smtClean="0"/>
-              <a:t>04-Apr-16</a:t>
+              <a:t>11-Apr-16</a:t>
             </a:fld>
             <a:endParaRPr lang="en-US"/>
           </a:p>
@@ -3342,7 +3786,7 @@
           <a:p>
             <a:fld id="{6F66794D-9D79-4AC5-96DA-597EA4BF2704}" type="datetimeFigureOut">
               <a:rPr lang="en-US" smtClean="0"/>
-              <a:t>04-Apr-16</a:t>
+              <a:t>11-Apr-16</a:t>
             </a:fld>
             <a:endParaRPr lang="en-US"/>
           </a:p>
@@ -3630,7 +4074,7 @@
           <a:p>
             <a:fld id="{6F66794D-9D79-4AC5-96DA-597EA4BF2704}" type="datetimeFigureOut">
               <a:rPr lang="en-US" smtClean="0"/>
-              <a:t>04-Apr-16</a:t>
+              <a:t>11-Apr-16</a:t>
             </a:fld>
             <a:endParaRPr lang="en-US"/>
           </a:p>
@@ -3934,7 +4378,7 @@
           <a:p>
             <a:fld id="{6F66794D-9D79-4AC5-96DA-597EA4BF2704}" type="datetimeFigureOut">
               <a:rPr lang="en-US" smtClean="0"/>
-              <a:t>04-Apr-16</a:t>
+              <a:t>11-Apr-16</a:t>
             </a:fld>
             <a:endParaRPr lang="en-US"/>
           </a:p>
@@ -4413,7 +4857,7 @@
           <a:p>
             <a:fld id="{6F66794D-9D79-4AC5-96DA-597EA4BF2704}" type="datetimeFigureOut">
               <a:rPr lang="en-US" smtClean="0"/>
-              <a:t>04-Apr-16</a:t>
+              <a:t>11-Apr-16</a:t>
             </a:fld>
             <a:endParaRPr lang="en-US"/>
           </a:p>
@@ -4568,7 +5012,7 @@
           <a:p>
             <a:fld id="{6F66794D-9D79-4AC5-96DA-597EA4BF2704}" type="datetimeFigureOut">
               <a:rPr lang="en-US" smtClean="0"/>
-              <a:t>04-Apr-16</a:t>
+              <a:t>11-Apr-16</a:t>
             </a:fld>
             <a:endParaRPr lang="en-US"/>
           </a:p>
@@ -4663,7 +5107,7 @@
           <a:p>
             <a:fld id="{6F66794D-9D79-4AC5-96DA-597EA4BF2704}" type="datetimeFigureOut">
               <a:rPr lang="en-US" smtClean="0"/>
-              <a:t>04-Apr-16</a:t>
+              <a:t>11-Apr-16</a:t>
             </a:fld>
             <a:endParaRPr lang="en-US"/>
           </a:p>
@@ -4946,7 +5390,7 @@
           <a:p>
             <a:fld id="{6F66794D-9D79-4AC5-96DA-597EA4BF2704}" type="datetimeFigureOut">
               <a:rPr lang="en-US" smtClean="0"/>
-              <a:t>04-Apr-16</a:t>
+              <a:t>11-Apr-16</a:t>
             </a:fld>
             <a:endParaRPr lang="en-US"/>
           </a:p>
@@ -5237,7 +5681,7 @@
           <a:p>
             <a:fld id="{6F66794D-9D79-4AC5-96DA-597EA4BF2704}" type="datetimeFigureOut">
               <a:rPr lang="en-US" smtClean="0"/>
-              <a:t>04-Apr-16</a:t>
+              <a:t>11-Apr-16</a:t>
             </a:fld>
             <a:endParaRPr lang="en-US"/>
           </a:p>
@@ -5767,7 +6211,7 @@
           <a:p>
             <a:fld id="{6F66794D-9D79-4AC5-96DA-597EA4BF2704}" type="datetimeFigureOut">
               <a:rPr lang="en-US" smtClean="0"/>
-              <a:t>04-Apr-16</a:t>
+              <a:t>11-Apr-16</a:t>
             </a:fld>
             <a:endParaRPr lang="en-US"/>
           </a:p>
@@ -6344,11 +6788,7 @@
           <a:p>
             <a:r>
               <a:rPr lang="bg-BG" dirty="0" smtClean="0"/>
-              <a:t>Цикли </a:t>
-            </a:r>
-            <a:r>
-              <a:rPr lang="bg-BG" dirty="0" smtClean="0"/>
-              <a:t>в </a:t>
+              <a:t>Цикли в </a:t>
             </a:r>
             <a:r>
               <a:rPr lang="en-US" dirty="0" smtClean="0"/>
@@ -6411,6 +6851,918 @@
 </p:sld>
 </file>
 
+<file path=ppt/slides/slide10.xml><?xml version="1.0" encoding="utf-8"?>
+<p:sld xmlns:a="http://schemas.openxmlformats.org/drawingml/2006/main" xmlns:r="http://schemas.openxmlformats.org/officeDocument/2006/relationships" xmlns:p="http://schemas.openxmlformats.org/presentationml/2006/main">
+  <p:cSld>
+    <p:spTree>
+      <p:nvGrpSpPr>
+        <p:cNvPr id="1" name=""/>
+        <p:cNvGrpSpPr/>
+        <p:nvPr/>
+      </p:nvGrpSpPr>
+      <p:grpSpPr>
+        <a:xfrm>
+          <a:off x="0" y="0"/>
+          <a:ext cx="0" cy="0"/>
+          <a:chOff x="0" y="0"/>
+          <a:chExt cx="0" cy="0"/>
+        </a:xfrm>
+      </p:grpSpPr>
+      <p:sp>
+        <p:nvSpPr>
+          <p:cNvPr id="2" name="Title 1"/>
+          <p:cNvSpPr>
+            <a:spLocks noGrp="1"/>
+          </p:cNvSpPr>
+          <p:nvPr>
+            <p:ph type="title"/>
+          </p:nvPr>
+        </p:nvSpPr>
+        <p:spPr/>
+        <p:txBody>
+          <a:bodyPr/>
+          <a:lstStyle/>
+          <a:p>
+            <a:r>
+              <a:rPr lang="bg-BG" dirty="0" smtClean="0"/>
+              <a:t>Вложени цикли</a:t>
+            </a:r>
+            <a:endParaRPr lang="en-US" dirty="0"/>
+          </a:p>
+        </p:txBody>
+      </p:sp>
+      <p:sp>
+        <p:nvSpPr>
+          <p:cNvPr id="3" name="Content Placeholder 2"/>
+          <p:cNvSpPr>
+            <a:spLocks noGrp="1"/>
+          </p:cNvSpPr>
+          <p:nvPr>
+            <p:ph idx="1"/>
+          </p:nvPr>
+        </p:nvSpPr>
+        <p:spPr/>
+        <p:txBody>
+          <a:bodyPr/>
+          <a:lstStyle/>
+          <a:p>
+            <a:r>
+              <a:rPr lang="bg-BG" dirty="0" smtClean="0"/>
+              <a:t>Цикли, които се намират в други цикли</a:t>
+            </a:r>
+          </a:p>
+          <a:p>
+            <a:r>
+              <a:rPr lang="bg-BG" dirty="0" smtClean="0"/>
+              <a:t>Изпълнението им започва от най-външния</a:t>
+            </a:r>
+          </a:p>
+          <a:p>
+            <a:r>
+              <a:rPr lang="bg-BG" dirty="0" smtClean="0"/>
+              <a:t>Най-вътрешния се изпълнява, докато приключи</a:t>
+            </a:r>
+          </a:p>
+          <a:p>
+            <a:r>
+              <a:rPr lang="bg-BG" dirty="0" smtClean="0"/>
+              <a:t>След като най-вътрешния приключи своето изпълнение, се преминва към следващия отвътре навън</a:t>
+            </a:r>
+            <a:endParaRPr lang="en-US" dirty="0"/>
+          </a:p>
+        </p:txBody>
+      </p:sp>
+      <p:sp>
+        <p:nvSpPr>
+          <p:cNvPr id="5" name="TextBox 4"/>
+          <p:cNvSpPr txBox="1"/>
+          <p:nvPr/>
+        </p:nvSpPr>
+        <p:spPr>
+          <a:xfrm>
+            <a:off x="7911813" y="5103674"/>
+            <a:ext cx="4280187" cy="1754326"/>
+          </a:xfrm>
+          <a:prstGeom prst="rect">
+            <a:avLst/>
+          </a:prstGeom>
+        </p:spPr>
+        <p:style>
+          <a:lnRef idx="0">
+            <a:schemeClr val="accent1"/>
+          </a:lnRef>
+          <a:fillRef idx="3">
+            <a:schemeClr val="accent1"/>
+          </a:fillRef>
+          <a:effectRef idx="3">
+            <a:schemeClr val="accent1"/>
+          </a:effectRef>
+          <a:fontRef idx="minor">
+            <a:schemeClr val="lt1"/>
+          </a:fontRef>
+        </p:style>
+        <p:txBody>
+          <a:bodyPr wrap="square" rtlCol="0">
+            <a:spAutoFit/>
+          </a:bodyPr>
+          <a:lstStyle/>
+          <a:p>
+            <a:r>
+              <a:rPr lang="en-US" dirty="0" smtClean="0">
+                <a:latin typeface="Calibri" panose="020F0502020204030204" pitchFamily="34" charset="0"/>
+              </a:rPr>
+              <a:t>for (initialization; test; update) {</a:t>
+            </a:r>
+          </a:p>
+          <a:p>
+            <a:r>
+              <a:rPr lang="en-US" dirty="0" smtClean="0">
+                <a:latin typeface="Calibri" panose="020F0502020204030204" pitchFamily="34" charset="0"/>
+              </a:rPr>
+              <a:t>      for (initialization; test; update) {</a:t>
+            </a:r>
+          </a:p>
+          <a:p>
+            <a:r>
+              <a:rPr lang="en-US" dirty="0" smtClean="0">
+                <a:latin typeface="Calibri" panose="020F0502020204030204" pitchFamily="34" charset="0"/>
+              </a:rPr>
+              <a:t>             // loop body</a:t>
+            </a:r>
+          </a:p>
+          <a:p>
+            <a:r>
+              <a:rPr lang="en-US" dirty="0">
+                <a:latin typeface="Calibri" panose="020F0502020204030204" pitchFamily="34" charset="0"/>
+              </a:rPr>
+              <a:t> </a:t>
+            </a:r>
+            <a:r>
+              <a:rPr lang="en-US" dirty="0" smtClean="0">
+                <a:latin typeface="Calibri" panose="020F0502020204030204" pitchFamily="34" charset="0"/>
+              </a:rPr>
+              <a:t>     }</a:t>
+            </a:r>
+          </a:p>
+          <a:p>
+            <a:r>
+              <a:rPr lang="en-US" dirty="0">
+                <a:latin typeface="Calibri" panose="020F0502020204030204" pitchFamily="34" charset="0"/>
+              </a:rPr>
+              <a:t> </a:t>
+            </a:r>
+            <a:r>
+              <a:rPr lang="en-US" dirty="0" smtClean="0">
+                <a:latin typeface="Calibri" panose="020F0502020204030204" pitchFamily="34" charset="0"/>
+              </a:rPr>
+              <a:t>     ……</a:t>
+            </a:r>
+          </a:p>
+          <a:p>
+            <a:r>
+              <a:rPr lang="en-US" dirty="0">
+                <a:latin typeface="Calibri" panose="020F0502020204030204" pitchFamily="34" charset="0"/>
+              </a:rPr>
+              <a:t>}</a:t>
+            </a:r>
+            <a:endParaRPr lang="en-US" dirty="0" smtClean="0">
+              <a:latin typeface="Calibri" panose="020F0502020204030204" pitchFamily="34" charset="0"/>
+            </a:endParaRPr>
+          </a:p>
+        </p:txBody>
+      </p:sp>
+    </p:spTree>
+    <p:extLst>
+      <p:ext uri="{BB962C8B-B14F-4D97-AF65-F5344CB8AC3E}">
+        <p14:creationId xmlns:p14="http://schemas.microsoft.com/office/powerpoint/2010/main" val="3840944973"/>
+      </p:ext>
+    </p:extLst>
+  </p:cSld>
+  <p:clrMapOvr>
+    <a:masterClrMapping/>
+  </p:clrMapOvr>
+</p:sld>
+</file>
+
+<file path=ppt/slides/slide11.xml><?xml version="1.0" encoding="utf-8"?>
+<p:sld xmlns:a="http://schemas.openxmlformats.org/drawingml/2006/main" xmlns:r="http://schemas.openxmlformats.org/officeDocument/2006/relationships" xmlns:p="http://schemas.openxmlformats.org/presentationml/2006/main">
+  <p:cSld>
+    <p:spTree>
+      <p:nvGrpSpPr>
+        <p:cNvPr id="1" name=""/>
+        <p:cNvGrpSpPr/>
+        <p:nvPr/>
+      </p:nvGrpSpPr>
+      <p:grpSpPr>
+        <a:xfrm>
+          <a:off x="0" y="0"/>
+          <a:ext cx="0" cy="0"/>
+          <a:chOff x="0" y="0"/>
+          <a:chExt cx="0" cy="0"/>
+        </a:xfrm>
+      </p:grpSpPr>
+      <p:sp>
+        <p:nvSpPr>
+          <p:cNvPr id="2" name="Title 1"/>
+          <p:cNvSpPr>
+            <a:spLocks noGrp="1"/>
+          </p:cNvSpPr>
+          <p:nvPr>
+            <p:ph type="title"/>
+          </p:nvPr>
+        </p:nvSpPr>
+        <p:spPr/>
+        <p:txBody>
+          <a:bodyPr/>
+          <a:lstStyle/>
+          <a:p>
+            <a:r>
+              <a:rPr lang="en-US" i="1" dirty="0">
+                <a:solidFill>
+                  <a:schemeClr val="accent6">
+                    <a:lumMod val="75000"/>
+                  </a:schemeClr>
+                </a:solidFill>
+              </a:rPr>
+              <a:t>f</a:t>
+            </a:r>
+            <a:r>
+              <a:rPr lang="en-US" i="1" dirty="0" smtClean="0">
+                <a:solidFill>
+                  <a:schemeClr val="accent6">
+                    <a:lumMod val="75000"/>
+                  </a:schemeClr>
+                </a:solidFill>
+              </a:rPr>
+              <a:t>or-in</a:t>
+            </a:r>
+            <a:r>
+              <a:rPr lang="en-US" dirty="0" smtClean="0"/>
+              <a:t> </a:t>
+            </a:r>
+            <a:r>
+              <a:rPr lang="bg-BG" dirty="0" smtClean="0"/>
+              <a:t>цикъл</a:t>
+            </a:r>
+            <a:endParaRPr lang="en-US" dirty="0"/>
+          </a:p>
+        </p:txBody>
+      </p:sp>
+      <p:sp>
+        <p:nvSpPr>
+          <p:cNvPr id="3" name="Content Placeholder 2"/>
+          <p:cNvSpPr>
+            <a:spLocks noGrp="1"/>
+          </p:cNvSpPr>
+          <p:nvPr>
+            <p:ph idx="1"/>
+          </p:nvPr>
+        </p:nvSpPr>
+        <p:spPr/>
+        <p:txBody>
+          <a:bodyPr/>
+          <a:lstStyle/>
+          <a:p>
+            <a:r>
+              <a:rPr lang="bg-BG" dirty="0" smtClean="0"/>
+              <a:t>Работата му е сходна с тази на </a:t>
+            </a:r>
+            <a:r>
+              <a:rPr lang="en-US" i="1" dirty="0" smtClean="0">
+                <a:solidFill>
+                  <a:schemeClr val="accent6">
+                    <a:lumMod val="75000"/>
+                  </a:schemeClr>
+                </a:solidFill>
+              </a:rPr>
+              <a:t>for</a:t>
+            </a:r>
+            <a:r>
+              <a:rPr lang="en-US" dirty="0" smtClean="0"/>
+              <a:t> </a:t>
+            </a:r>
+            <a:r>
+              <a:rPr lang="bg-BG" dirty="0" smtClean="0"/>
+              <a:t>цикъла</a:t>
+            </a:r>
+          </a:p>
+          <a:p>
+            <a:r>
+              <a:rPr lang="bg-BG" dirty="0" smtClean="0"/>
+              <a:t>Използва се за итериране по пропъртита на даден обект</a:t>
+            </a:r>
+          </a:p>
+          <a:p>
+            <a:r>
+              <a:rPr lang="bg-BG" dirty="0" smtClean="0"/>
+              <a:t>Трябва да се внимава дали се итерират собствени пропъртита или вградени</a:t>
+            </a:r>
+            <a:endParaRPr lang="en-US" dirty="0"/>
+          </a:p>
+        </p:txBody>
+      </p:sp>
+      <p:sp>
+        <p:nvSpPr>
+          <p:cNvPr id="4" name="TextBox 3"/>
+          <p:cNvSpPr txBox="1"/>
+          <p:nvPr/>
+        </p:nvSpPr>
+        <p:spPr>
+          <a:xfrm>
+            <a:off x="8425090" y="5558135"/>
+            <a:ext cx="3428915" cy="923330"/>
+          </a:xfrm>
+          <a:prstGeom prst="rect">
+            <a:avLst/>
+          </a:prstGeom>
+        </p:spPr>
+        <p:style>
+          <a:lnRef idx="0">
+            <a:schemeClr val="accent1"/>
+          </a:lnRef>
+          <a:fillRef idx="3">
+            <a:schemeClr val="accent1"/>
+          </a:fillRef>
+          <a:effectRef idx="3">
+            <a:schemeClr val="accent1"/>
+          </a:effectRef>
+          <a:fontRef idx="minor">
+            <a:schemeClr val="lt1"/>
+          </a:fontRef>
+        </p:style>
+        <p:txBody>
+          <a:bodyPr wrap="square" rtlCol="0">
+            <a:spAutoFit/>
+          </a:bodyPr>
+          <a:lstStyle/>
+          <a:p>
+            <a:r>
+              <a:rPr lang="en-US" dirty="0" smtClean="0">
+                <a:latin typeface="Calibri" panose="020F0502020204030204" pitchFamily="34" charset="0"/>
+              </a:rPr>
+              <a:t>for (</a:t>
+            </a:r>
+            <a:r>
+              <a:rPr lang="en-US" dirty="0" err="1" smtClean="0">
+                <a:latin typeface="Calibri" panose="020F0502020204030204" pitchFamily="34" charset="0"/>
+              </a:rPr>
+              <a:t>var</a:t>
+            </a:r>
+            <a:r>
+              <a:rPr lang="en-US" dirty="0">
+                <a:latin typeface="Calibri" panose="020F0502020204030204" pitchFamily="34" charset="0"/>
+              </a:rPr>
+              <a:t> </a:t>
+            </a:r>
+            <a:r>
+              <a:rPr lang="en-US" dirty="0" smtClean="0">
+                <a:latin typeface="Calibri" panose="020F0502020204030204" pitchFamily="34" charset="0"/>
+              </a:rPr>
+              <a:t>key in object) </a:t>
+            </a:r>
+            <a:r>
+              <a:rPr lang="en-US" dirty="0" smtClean="0">
+                <a:latin typeface="Calibri" panose="020F0502020204030204" pitchFamily="34" charset="0"/>
+              </a:rPr>
+              <a:t>{</a:t>
+            </a:r>
+          </a:p>
+          <a:p>
+            <a:r>
+              <a:rPr lang="en-US" dirty="0">
+                <a:latin typeface="Calibri" panose="020F0502020204030204" pitchFamily="34" charset="0"/>
+              </a:rPr>
+              <a:t> </a:t>
+            </a:r>
+            <a:r>
+              <a:rPr lang="en-US" dirty="0" smtClean="0">
+                <a:latin typeface="Calibri" panose="020F0502020204030204" pitchFamily="34" charset="0"/>
+              </a:rPr>
+              <a:t>     // loop body</a:t>
+            </a:r>
+          </a:p>
+          <a:p>
+            <a:r>
+              <a:rPr lang="en-US" dirty="0">
+                <a:latin typeface="Calibri" panose="020F0502020204030204" pitchFamily="34" charset="0"/>
+              </a:rPr>
+              <a:t>}</a:t>
+            </a:r>
+            <a:endParaRPr lang="en-US" dirty="0" smtClean="0">
+              <a:latin typeface="Calibri" panose="020F0502020204030204" pitchFamily="34" charset="0"/>
+            </a:endParaRPr>
+          </a:p>
+        </p:txBody>
+      </p:sp>
+    </p:spTree>
+    <p:extLst>
+      <p:ext uri="{BB962C8B-B14F-4D97-AF65-F5344CB8AC3E}">
+        <p14:creationId xmlns:p14="http://schemas.microsoft.com/office/powerpoint/2010/main" val="2732792725"/>
+      </p:ext>
+    </p:extLst>
+  </p:cSld>
+  <p:clrMapOvr>
+    <a:masterClrMapping/>
+  </p:clrMapOvr>
+</p:sld>
+</file>
+
+<file path=ppt/slides/slide12.xml><?xml version="1.0" encoding="utf-8"?>
+<p:sld xmlns:a="http://schemas.openxmlformats.org/drawingml/2006/main" xmlns:r="http://schemas.openxmlformats.org/officeDocument/2006/relationships" xmlns:p="http://schemas.openxmlformats.org/presentationml/2006/main">
+  <p:cSld>
+    <p:spTree>
+      <p:nvGrpSpPr>
+        <p:cNvPr id="1" name=""/>
+        <p:cNvGrpSpPr/>
+        <p:nvPr/>
+      </p:nvGrpSpPr>
+      <p:grpSpPr>
+        <a:xfrm>
+          <a:off x="0" y="0"/>
+          <a:ext cx="0" cy="0"/>
+          <a:chOff x="0" y="0"/>
+          <a:chExt cx="0" cy="0"/>
+        </a:xfrm>
+      </p:grpSpPr>
+      <p:sp>
+        <p:nvSpPr>
+          <p:cNvPr id="2" name="Title 1"/>
+          <p:cNvSpPr>
+            <a:spLocks noGrp="1"/>
+          </p:cNvSpPr>
+          <p:nvPr>
+            <p:ph type="title"/>
+          </p:nvPr>
+        </p:nvSpPr>
+        <p:spPr/>
+        <p:txBody>
+          <a:bodyPr/>
+          <a:lstStyle/>
+          <a:p>
+            <a:r>
+              <a:rPr lang="en-US" i="1" dirty="0" smtClean="0">
+                <a:solidFill>
+                  <a:schemeClr val="accent6">
+                    <a:lumMod val="75000"/>
+                  </a:schemeClr>
+                </a:solidFill>
+              </a:rPr>
+              <a:t>for-of</a:t>
+            </a:r>
+            <a:r>
+              <a:rPr lang="en-US" dirty="0" smtClean="0"/>
+              <a:t> </a:t>
+            </a:r>
+            <a:r>
+              <a:rPr lang="bg-BG" dirty="0" smtClean="0"/>
+              <a:t>цикъл</a:t>
+            </a:r>
+            <a:endParaRPr lang="en-US" dirty="0"/>
+          </a:p>
+        </p:txBody>
+      </p:sp>
+      <p:sp>
+        <p:nvSpPr>
+          <p:cNvPr id="3" name="Content Placeholder 2"/>
+          <p:cNvSpPr>
+            <a:spLocks noGrp="1"/>
+          </p:cNvSpPr>
+          <p:nvPr>
+            <p:ph idx="1"/>
+          </p:nvPr>
+        </p:nvSpPr>
+        <p:spPr/>
+        <p:txBody>
+          <a:bodyPr/>
+          <a:lstStyle/>
+          <a:p>
+            <a:r>
+              <a:rPr lang="bg-BG" dirty="0" smtClean="0"/>
+              <a:t>Използва се за итериране на масиви и масивоподобни обекти</a:t>
+            </a:r>
+          </a:p>
+          <a:p>
+            <a:r>
+              <a:rPr lang="bg-BG" dirty="0" smtClean="0"/>
+              <a:t>Дава имплементация на т.нар. </a:t>
+            </a:r>
+            <a:r>
+              <a:rPr lang="en-US" dirty="0" smtClean="0"/>
+              <a:t>Iterator</a:t>
+            </a:r>
+            <a:r>
+              <a:rPr lang="bg-BG" dirty="0" smtClean="0"/>
+              <a:t> шаблон за дизайн</a:t>
+            </a:r>
+          </a:p>
+          <a:p>
+            <a:r>
+              <a:rPr lang="bg-BG" dirty="0" smtClean="0"/>
+              <a:t>Навлиза с </a:t>
+            </a:r>
+            <a:r>
+              <a:rPr lang="en-US" dirty="0" smtClean="0"/>
+              <a:t>EcmaScript 2015</a:t>
+            </a:r>
+          </a:p>
+          <a:p>
+            <a:r>
+              <a:rPr lang="bg-BG" dirty="0" smtClean="0">
+                <a:solidFill>
+                  <a:srgbClr val="FF0000"/>
+                </a:solidFill>
+              </a:rPr>
+              <a:t>Поддържа се само от последните версии на браузърите</a:t>
+            </a:r>
+          </a:p>
+          <a:p>
+            <a:pPr marL="0" indent="0">
+              <a:buNone/>
+            </a:pPr>
+            <a:endParaRPr lang="bg-BG" dirty="0" smtClean="0">
+              <a:solidFill>
+                <a:srgbClr val="FF0000"/>
+              </a:solidFill>
+            </a:endParaRPr>
+          </a:p>
+          <a:p>
+            <a:endParaRPr lang="en-US" dirty="0"/>
+          </a:p>
+        </p:txBody>
+      </p:sp>
+      <p:sp>
+        <p:nvSpPr>
+          <p:cNvPr id="4" name="TextBox 3"/>
+          <p:cNvSpPr txBox="1"/>
+          <p:nvPr/>
+        </p:nvSpPr>
+        <p:spPr>
+          <a:xfrm>
+            <a:off x="8425090" y="5558135"/>
+            <a:ext cx="3428915" cy="923330"/>
+          </a:xfrm>
+          <a:prstGeom prst="rect">
+            <a:avLst/>
+          </a:prstGeom>
+        </p:spPr>
+        <p:style>
+          <a:lnRef idx="0">
+            <a:schemeClr val="accent1"/>
+          </a:lnRef>
+          <a:fillRef idx="3">
+            <a:schemeClr val="accent1"/>
+          </a:fillRef>
+          <a:effectRef idx="3">
+            <a:schemeClr val="accent1"/>
+          </a:effectRef>
+          <a:fontRef idx="minor">
+            <a:schemeClr val="lt1"/>
+          </a:fontRef>
+        </p:style>
+        <p:txBody>
+          <a:bodyPr wrap="square" rtlCol="0">
+            <a:spAutoFit/>
+          </a:bodyPr>
+          <a:lstStyle/>
+          <a:p>
+            <a:r>
+              <a:rPr lang="en-US" dirty="0" smtClean="0">
+                <a:latin typeface="Calibri" panose="020F0502020204030204" pitchFamily="34" charset="0"/>
+              </a:rPr>
+              <a:t>for (</a:t>
+            </a:r>
+            <a:r>
+              <a:rPr lang="en-US" dirty="0" err="1" smtClean="0">
+                <a:latin typeface="Calibri" panose="020F0502020204030204" pitchFamily="34" charset="0"/>
+              </a:rPr>
+              <a:t>var</a:t>
+            </a:r>
+            <a:r>
+              <a:rPr lang="en-US" dirty="0">
+                <a:latin typeface="Calibri" panose="020F0502020204030204" pitchFamily="34" charset="0"/>
+              </a:rPr>
+              <a:t> </a:t>
+            </a:r>
+            <a:r>
+              <a:rPr lang="en-US" dirty="0" smtClean="0">
+                <a:latin typeface="Calibri" panose="020F0502020204030204" pitchFamily="34" charset="0"/>
+              </a:rPr>
+              <a:t>key of object) </a:t>
+            </a:r>
+            <a:r>
+              <a:rPr lang="en-US" dirty="0" smtClean="0">
+                <a:latin typeface="Calibri" panose="020F0502020204030204" pitchFamily="34" charset="0"/>
+              </a:rPr>
+              <a:t>{</a:t>
+            </a:r>
+          </a:p>
+          <a:p>
+            <a:r>
+              <a:rPr lang="en-US" dirty="0">
+                <a:latin typeface="Calibri" panose="020F0502020204030204" pitchFamily="34" charset="0"/>
+              </a:rPr>
+              <a:t> </a:t>
+            </a:r>
+            <a:r>
+              <a:rPr lang="en-US" dirty="0" smtClean="0">
+                <a:latin typeface="Calibri" panose="020F0502020204030204" pitchFamily="34" charset="0"/>
+              </a:rPr>
+              <a:t>     // loop body</a:t>
+            </a:r>
+          </a:p>
+          <a:p>
+            <a:r>
+              <a:rPr lang="en-US" dirty="0">
+                <a:latin typeface="Calibri" panose="020F0502020204030204" pitchFamily="34" charset="0"/>
+              </a:rPr>
+              <a:t>}</a:t>
+            </a:r>
+            <a:endParaRPr lang="en-US" dirty="0" smtClean="0">
+              <a:latin typeface="Calibri" panose="020F0502020204030204" pitchFamily="34" charset="0"/>
+            </a:endParaRPr>
+          </a:p>
+        </p:txBody>
+      </p:sp>
+    </p:spTree>
+    <p:extLst>
+      <p:ext uri="{BB962C8B-B14F-4D97-AF65-F5344CB8AC3E}">
+        <p14:creationId xmlns:p14="http://schemas.microsoft.com/office/powerpoint/2010/main" val="2317577615"/>
+      </p:ext>
+    </p:extLst>
+  </p:cSld>
+  <p:clrMapOvr>
+    <a:masterClrMapping/>
+  </p:clrMapOvr>
+</p:sld>
+</file>
+
+<file path=ppt/slides/slide13.xml><?xml version="1.0" encoding="utf-8"?>
+<p:sld xmlns:a="http://schemas.openxmlformats.org/drawingml/2006/main" xmlns:r="http://schemas.openxmlformats.org/officeDocument/2006/relationships" xmlns:p="http://schemas.openxmlformats.org/presentationml/2006/main">
+  <p:cSld>
+    <p:spTree>
+      <p:nvGrpSpPr>
+        <p:cNvPr id="1" name=""/>
+        <p:cNvGrpSpPr/>
+        <p:nvPr/>
+      </p:nvGrpSpPr>
+      <p:grpSpPr>
+        <a:xfrm>
+          <a:off x="0" y="0"/>
+          <a:ext cx="0" cy="0"/>
+          <a:chOff x="0" y="0"/>
+          <a:chExt cx="0" cy="0"/>
+        </a:xfrm>
+      </p:grpSpPr>
+      <p:pic>
+        <p:nvPicPr>
+          <p:cNvPr id="4" name="Content Placeholder 3"/>
+          <p:cNvPicPr>
+            <a:picLocks noGrp="1" noChangeAspect="1"/>
+          </p:cNvPicPr>
+          <p:nvPr>
+            <p:ph idx="1"/>
+          </p:nvPr>
+        </p:nvPicPr>
+        <p:blipFill>
+          <a:blip r:embed="rId2">
+            <a:extLst>
+              <a:ext uri="{28A0092B-C50C-407E-A947-70E740481C1C}">
+                <a14:useLocalDpi xmlns:a14="http://schemas.microsoft.com/office/drawing/2010/main" val="0"/>
+              </a:ext>
+            </a:extLst>
+          </a:blip>
+          <a:stretch>
+            <a:fillRect/>
+          </a:stretch>
+        </p:blipFill>
+        <p:spPr>
+          <a:xfrm>
+            <a:off x="3862422" y="506026"/>
+            <a:ext cx="4766673" cy="5934509"/>
+          </a:xfrm>
+        </p:spPr>
+      </p:pic>
+    </p:spTree>
+    <p:extLst>
+      <p:ext uri="{BB962C8B-B14F-4D97-AF65-F5344CB8AC3E}">
+        <p14:creationId xmlns:p14="http://schemas.microsoft.com/office/powerpoint/2010/main" val="475375314"/>
+      </p:ext>
+    </p:extLst>
+  </p:cSld>
+  <p:clrMapOvr>
+    <a:masterClrMapping/>
+  </p:clrMapOvr>
+  <p:timing>
+    <p:tnLst>
+      <p:par>
+        <p:cTn id="1" dur="indefinite" restart="never" nodeType="tmRoot"/>
+      </p:par>
+    </p:tnLst>
+  </p:timing>
+</p:sld>
+</file>
+
+<file path=ppt/slides/slide14.xml><?xml version="1.0" encoding="utf-8"?>
+<p:sld xmlns:a="http://schemas.openxmlformats.org/drawingml/2006/main" xmlns:r="http://schemas.openxmlformats.org/officeDocument/2006/relationships" xmlns:p="http://schemas.openxmlformats.org/presentationml/2006/main">
+  <p:cSld>
+    <p:spTree>
+      <p:nvGrpSpPr>
+        <p:cNvPr id="1" name=""/>
+        <p:cNvGrpSpPr/>
+        <p:nvPr/>
+      </p:nvGrpSpPr>
+      <p:grpSpPr>
+        <a:xfrm>
+          <a:off x="0" y="0"/>
+          <a:ext cx="0" cy="0"/>
+          <a:chOff x="0" y="0"/>
+          <a:chExt cx="0" cy="0"/>
+        </a:xfrm>
+      </p:grpSpPr>
+      <p:sp>
+        <p:nvSpPr>
+          <p:cNvPr id="2" name="Title 1"/>
+          <p:cNvSpPr>
+            <a:spLocks noGrp="1"/>
+          </p:cNvSpPr>
+          <p:nvPr>
+            <p:ph type="title"/>
+          </p:nvPr>
+        </p:nvSpPr>
+        <p:spPr/>
+        <p:txBody>
+          <a:bodyPr/>
+          <a:lstStyle/>
+          <a:p>
+            <a:r>
+              <a:rPr lang="bg-BG" dirty="0" smtClean="0"/>
+              <a:t>Домашна работа</a:t>
+            </a:r>
+            <a:endParaRPr lang="en-US" dirty="0"/>
+          </a:p>
+        </p:txBody>
+      </p:sp>
+      <p:sp>
+        <p:nvSpPr>
+          <p:cNvPr id="3" name="Content Placeholder 2"/>
+          <p:cNvSpPr>
+            <a:spLocks noGrp="1"/>
+          </p:cNvSpPr>
+          <p:nvPr>
+            <p:ph idx="1"/>
+          </p:nvPr>
+        </p:nvSpPr>
+        <p:spPr>
+          <a:xfrm>
+            <a:off x="1484310" y="2666999"/>
+            <a:ext cx="10199690" cy="3124201"/>
+          </a:xfrm>
+        </p:spPr>
+        <p:txBody>
+          <a:bodyPr anchor="ctr" anchorCtr="0">
+            <a:normAutofit fontScale="92500" lnSpcReduction="10000"/>
+          </a:bodyPr>
+          <a:lstStyle/>
+          <a:p>
+            <a:pPr marL="457200" indent="-457200">
+              <a:buFont typeface="+mj-lt"/>
+              <a:buAutoNum type="arabicPeriod"/>
+            </a:pPr>
+            <a:r>
+              <a:rPr lang="bg-BG" dirty="0" smtClean="0"/>
+              <a:t>Напишете </a:t>
+            </a:r>
+            <a:r>
+              <a:rPr lang="en-US" dirty="0" smtClean="0"/>
+              <a:t>JS</a:t>
+            </a:r>
+            <a:r>
+              <a:rPr lang="bg-BG" dirty="0"/>
+              <a:t> </a:t>
+            </a:r>
+            <a:r>
+              <a:rPr lang="bg-BG" dirty="0" smtClean="0"/>
+              <a:t>код, който по </a:t>
+            </a:r>
+            <a:r>
+              <a:rPr lang="bg-BG" dirty="0" smtClean="0"/>
+              <a:t>зададен интервал, да намира всички числа, които се делят на 3.</a:t>
+            </a:r>
+            <a:endParaRPr lang="bg-BG" dirty="0" smtClean="0"/>
+          </a:p>
+          <a:p>
+            <a:pPr marL="457200" indent="-457200">
+              <a:buFont typeface="+mj-lt"/>
+              <a:buAutoNum type="arabicPeriod"/>
+            </a:pPr>
+            <a:r>
+              <a:rPr lang="bg-BG" dirty="0" smtClean="0"/>
+              <a:t>Напишете </a:t>
+            </a:r>
+            <a:r>
+              <a:rPr lang="en-US" dirty="0" smtClean="0"/>
+              <a:t>JS </a:t>
+            </a:r>
+            <a:r>
+              <a:rPr lang="bg-BG" dirty="0" smtClean="0"/>
+              <a:t>код, който </a:t>
+            </a:r>
+            <a:r>
+              <a:rPr lang="bg-BG" dirty="0" smtClean="0"/>
+              <a:t>да намира всички „щастливите числа“. Ако </a:t>
+            </a:r>
+            <a:r>
+              <a:rPr lang="en-US" dirty="0" smtClean="0"/>
+              <a:t>A+B = C + D</a:t>
+            </a:r>
+            <a:r>
+              <a:rPr lang="bg-BG" dirty="0" smtClean="0"/>
+              <a:t>, то числото </a:t>
+            </a:r>
+            <a:r>
+              <a:rPr lang="en-US" dirty="0" smtClean="0"/>
+              <a:t>ABCD</a:t>
+            </a:r>
+            <a:r>
+              <a:rPr lang="bg-BG" dirty="0" smtClean="0"/>
+              <a:t> е щастливо. Например: 1322</a:t>
+            </a:r>
+            <a:endParaRPr lang="bg-BG" dirty="0" smtClean="0"/>
+          </a:p>
+          <a:p>
+            <a:pPr marL="457200" indent="-457200">
+              <a:buFont typeface="+mj-lt"/>
+              <a:buAutoNum type="arabicPeriod"/>
+            </a:pPr>
+            <a:r>
+              <a:rPr lang="bg-BG" dirty="0" smtClean="0"/>
+              <a:t>Напишете </a:t>
+            </a:r>
+            <a:r>
+              <a:rPr lang="en-US" dirty="0" smtClean="0"/>
+              <a:t>JS</a:t>
+            </a:r>
+            <a:r>
+              <a:rPr lang="bg-BG" dirty="0" smtClean="0"/>
+              <a:t> код, който </a:t>
+            </a:r>
+            <a:r>
+              <a:rPr lang="bg-BG" dirty="0" smtClean="0"/>
+              <a:t>намира най-голямото и най-малкото число в даден интервал</a:t>
+            </a:r>
+          </a:p>
+          <a:p>
+            <a:pPr marL="457200" indent="-457200">
+              <a:buFont typeface="+mj-lt"/>
+              <a:buAutoNum type="arabicPeriod"/>
+            </a:pPr>
+            <a:r>
+              <a:rPr lang="bg-BG" dirty="0" smtClean="0"/>
+              <a:t>Напишете </a:t>
+            </a:r>
+            <a:r>
+              <a:rPr lang="en-US" dirty="0" smtClean="0"/>
+              <a:t>JS</a:t>
+            </a:r>
+            <a:r>
+              <a:rPr lang="bg-BG" dirty="0" smtClean="0"/>
+              <a:t> код, който обхожда и принтира в конзолата всички пропъртитета на </a:t>
+            </a:r>
+            <a:r>
+              <a:rPr lang="en-US" i="1" dirty="0" smtClean="0">
+                <a:solidFill>
+                  <a:schemeClr val="accent6">
+                    <a:lumMod val="75000"/>
+                  </a:schemeClr>
+                </a:solidFill>
+              </a:rPr>
+              <a:t>window</a:t>
+            </a:r>
+            <a:r>
+              <a:rPr lang="en-US" dirty="0" smtClean="0"/>
+              <a:t> </a:t>
+            </a:r>
+            <a:r>
+              <a:rPr lang="bg-BG" dirty="0" smtClean="0"/>
+              <a:t>обекта</a:t>
+            </a:r>
+            <a:endParaRPr lang="bg-BG" dirty="0" smtClean="0"/>
+          </a:p>
+        </p:txBody>
+      </p:sp>
+    </p:spTree>
+    <p:extLst>
+      <p:ext uri="{BB962C8B-B14F-4D97-AF65-F5344CB8AC3E}">
+        <p14:creationId xmlns:p14="http://schemas.microsoft.com/office/powerpoint/2010/main" val="2161688977"/>
+      </p:ext>
+    </p:extLst>
+  </p:cSld>
+  <p:clrMapOvr>
+    <a:masterClrMapping/>
+  </p:clrMapOvr>
+</p:sld>
+</file>
+
 <file path=ppt/slides/slide2.xml><?xml version="1.0" encoding="utf-8"?>
 <p:sld xmlns:a="http://schemas.openxmlformats.org/drawingml/2006/main" xmlns:r="http://schemas.openxmlformats.org/officeDocument/2006/relationships" xmlns:p="http://schemas.openxmlformats.org/presentationml/2006/main">
   <p:cSld>
@@ -6449,11 +7801,7 @@
             </a:r>
             <a:r>
               <a:rPr lang="en-US" dirty="0" smtClean="0"/>
-              <a:t>loop</a:t>
-            </a:r>
-            <a:r>
-              <a:rPr lang="en-US" dirty="0" smtClean="0"/>
-              <a:t>s)</a:t>
+              <a:t>loops)</a:t>
             </a:r>
             <a:endParaRPr lang="en-US" dirty="0"/>
           </a:p>
@@ -7938,52 +9286,208 @@
           <a:chExt cx="0" cy="0"/>
         </a:xfrm>
       </p:grpSpPr>
-      <p:pic>
-        <p:nvPicPr>
-          <p:cNvPr id="4" name="Content Placeholder 3"/>
-          <p:cNvPicPr>
-            <a:picLocks noGrp="1" noChangeAspect="1"/>
-          </p:cNvPicPr>
+      <p:sp>
+        <p:nvSpPr>
+          <p:cNvPr id="2" name="Title 1"/>
+          <p:cNvSpPr>
+            <a:spLocks noGrp="1"/>
+          </p:cNvSpPr>
+          <p:nvPr>
+            <p:ph type="title"/>
+          </p:nvPr>
+        </p:nvSpPr>
+        <p:spPr/>
+        <p:txBody>
+          <a:bodyPr/>
+          <a:lstStyle/>
+          <a:p>
+            <a:r>
+              <a:rPr lang="en-US" i="1" dirty="0">
+                <a:solidFill>
+                  <a:schemeClr val="accent6">
+                    <a:lumMod val="75000"/>
+                  </a:schemeClr>
+                </a:solidFill>
+              </a:rPr>
+              <a:t>f</a:t>
+            </a:r>
+            <a:r>
+              <a:rPr lang="en-US" i="1" dirty="0" smtClean="0">
+                <a:solidFill>
+                  <a:schemeClr val="accent6">
+                    <a:lumMod val="75000"/>
+                  </a:schemeClr>
+                </a:solidFill>
+              </a:rPr>
+              <a:t>or</a:t>
+            </a:r>
+            <a:r>
+              <a:rPr lang="en-US" dirty="0" smtClean="0"/>
+              <a:t>-</a:t>
+            </a:r>
+            <a:r>
+              <a:rPr lang="bg-BG" dirty="0" smtClean="0"/>
+              <a:t>цикъл</a:t>
+            </a:r>
+            <a:endParaRPr lang="en-US" dirty="0"/>
+          </a:p>
+        </p:txBody>
+      </p:sp>
+      <p:sp>
+        <p:nvSpPr>
+          <p:cNvPr id="5" name="Content Placeholder 4"/>
+          <p:cNvSpPr>
+            <a:spLocks noGrp="1"/>
+          </p:cNvSpPr>
           <p:nvPr>
             <p:ph idx="1"/>
           </p:nvPr>
-        </p:nvPicPr>
-        <p:blipFill>
-          <a:blip r:embed="rId2">
-            <a:extLst>
-              <a:ext uri="{28A0092B-C50C-407E-A947-70E740481C1C}">
-                <a14:useLocalDpi xmlns:a14="http://schemas.microsoft.com/office/drawing/2010/main" val="0"/>
-              </a:ext>
-            </a:extLst>
-          </a:blip>
-          <a:stretch>
-            <a:fillRect/>
-          </a:stretch>
-        </p:blipFill>
+        </p:nvSpPr>
+        <p:spPr/>
+        <p:txBody>
+          <a:bodyPr/>
+          <a:lstStyle/>
+          <a:p>
+            <a:r>
+              <a:rPr lang="bg-BG" dirty="0" smtClean="0"/>
+              <a:t>Най-често използвания цикъл</a:t>
+            </a:r>
+          </a:p>
+          <a:p>
+            <a:r>
+              <a:rPr lang="bg-BG" dirty="0" smtClean="0"/>
+              <a:t>Състои се от</a:t>
+            </a:r>
+          </a:p>
+          <a:p>
+            <a:pPr lvl="1"/>
+            <a:r>
+              <a:rPr lang="bg-BG" dirty="0" smtClean="0"/>
+              <a:t>Инициализация </a:t>
+            </a:r>
+            <a:r>
+              <a:rPr lang="en-US" dirty="0" smtClean="0"/>
+              <a:t>(initialization)</a:t>
+            </a:r>
+            <a:endParaRPr lang="bg-BG" dirty="0" smtClean="0"/>
+          </a:p>
+          <a:p>
+            <a:pPr lvl="1"/>
+            <a:r>
+              <a:rPr lang="bg-BG" dirty="0" smtClean="0"/>
+              <a:t>Условие, което се оценява до булев израз</a:t>
+            </a:r>
+            <a:r>
+              <a:rPr lang="en-US" dirty="0" smtClean="0"/>
+              <a:t> (test expression)</a:t>
+            </a:r>
+            <a:endParaRPr lang="bg-BG" dirty="0" smtClean="0"/>
+          </a:p>
+          <a:p>
+            <a:pPr lvl="1"/>
+            <a:r>
+              <a:rPr lang="bg-BG" dirty="0" smtClean="0"/>
+              <a:t>Обновнление</a:t>
+            </a:r>
+            <a:r>
+              <a:rPr lang="en-US" dirty="0" smtClean="0"/>
+              <a:t> (update statement)</a:t>
+            </a:r>
+            <a:endParaRPr lang="bg-BG" dirty="0" smtClean="0"/>
+          </a:p>
+          <a:p>
+            <a:pPr lvl="1"/>
+            <a:r>
+              <a:rPr lang="bg-BG" dirty="0" smtClean="0"/>
+              <a:t>Тяло на цикъла</a:t>
+            </a:r>
+            <a:r>
+              <a:rPr lang="en-US" dirty="0" smtClean="0"/>
+              <a:t> (loop body)</a:t>
+            </a:r>
+            <a:endParaRPr lang="en-US" dirty="0"/>
+          </a:p>
+        </p:txBody>
+      </p:sp>
+      <p:sp>
+        <p:nvSpPr>
+          <p:cNvPr id="7" name="TextBox 6"/>
+          <p:cNvSpPr txBox="1"/>
+          <p:nvPr/>
+        </p:nvSpPr>
         <p:spPr>
           <a:xfrm>
-            <a:off x="3862422" y="506026"/>
-            <a:ext cx="4766673" cy="5934509"/>
+            <a:off x="6583303" y="5558135"/>
+            <a:ext cx="3231472" cy="923330"/>
           </a:xfrm>
+          <a:prstGeom prst="rect">
+            <a:avLst/>
+          </a:prstGeom>
         </p:spPr>
-      </p:pic>
+        <p:style>
+          <a:lnRef idx="0">
+            <a:schemeClr val="accent1"/>
+          </a:lnRef>
+          <a:fillRef idx="3">
+            <a:schemeClr val="accent1"/>
+          </a:fillRef>
+          <a:effectRef idx="3">
+            <a:schemeClr val="accent1"/>
+          </a:effectRef>
+          <a:fontRef idx="minor">
+            <a:schemeClr val="lt1"/>
+          </a:fontRef>
+        </p:style>
+        <p:txBody>
+          <a:bodyPr wrap="square" rtlCol="0">
+            <a:spAutoFit/>
+          </a:bodyPr>
+          <a:lstStyle/>
+          <a:p>
+            <a:r>
+              <a:rPr lang="en-US" dirty="0" smtClean="0">
+                <a:latin typeface="Calibri" panose="020F0502020204030204" pitchFamily="34" charset="0"/>
+              </a:rPr>
+              <a:t>for (initialization; test; update) {</a:t>
+            </a:r>
+          </a:p>
+          <a:p>
+            <a:r>
+              <a:rPr lang="en-US" dirty="0">
+                <a:latin typeface="Calibri" panose="020F0502020204030204" pitchFamily="34" charset="0"/>
+              </a:rPr>
+              <a:t> </a:t>
+            </a:r>
+            <a:r>
+              <a:rPr lang="en-US" dirty="0" smtClean="0">
+                <a:latin typeface="Calibri" panose="020F0502020204030204" pitchFamily="34" charset="0"/>
+              </a:rPr>
+              <a:t>     // loop body</a:t>
+            </a:r>
+          </a:p>
+          <a:p>
+            <a:r>
+              <a:rPr lang="en-US" dirty="0">
+                <a:latin typeface="Calibri" panose="020F0502020204030204" pitchFamily="34" charset="0"/>
+              </a:rPr>
+              <a:t>}</a:t>
+            </a:r>
+            <a:endParaRPr lang="en-US" dirty="0" smtClean="0">
+              <a:latin typeface="Calibri" panose="020F0502020204030204" pitchFamily="34" charset="0"/>
+            </a:endParaRPr>
+          </a:p>
+        </p:txBody>
+      </p:sp>
     </p:spTree>
     <p:extLst>
       <p:ext uri="{BB962C8B-B14F-4D97-AF65-F5344CB8AC3E}">
-        <p14:creationId xmlns:p14="http://schemas.microsoft.com/office/powerpoint/2010/main" val="475375314"/>
+        <p14:creationId xmlns:p14="http://schemas.microsoft.com/office/powerpoint/2010/main" val="3821393941"/>
       </p:ext>
     </p:extLst>
   </p:cSld>
   <p:clrMapOvr>
     <a:masterClrMapping/>
   </p:clrMapOvr>
-  <p:timing>
-    <p:tnLst>
-      <p:par>
-        <p:cTn id="1" dur="indefinite" restart="never" nodeType="tmRoot"/>
-      </p:par>
-    </p:tnLst>
-  </p:timing>
 </p:sld>
 </file>
 
@@ -8020,8 +9524,43 @@
           <a:lstStyle/>
           <a:p>
             <a:r>
+              <a:rPr lang="en-US" i="1" dirty="0">
+                <a:solidFill>
+                  <a:schemeClr val="accent6">
+                    <a:lumMod val="75000"/>
+                  </a:schemeClr>
+                </a:solidFill>
+              </a:rPr>
+              <a:t>f</a:t>
+            </a:r>
+            <a:r>
+              <a:rPr lang="en-US" i="1" dirty="0" smtClean="0">
+                <a:solidFill>
+                  <a:schemeClr val="accent6">
+                    <a:lumMod val="75000"/>
+                  </a:schemeClr>
+                </a:solidFill>
+              </a:rPr>
+              <a:t>or</a:t>
+            </a:r>
+            <a:r>
+              <a:rPr lang="en-US" dirty="0" smtClean="0"/>
+              <a:t>-</a:t>
+            </a:r>
+            <a:r>
               <a:rPr lang="bg-BG" dirty="0" smtClean="0"/>
-              <a:t>Домашна работа</a:t>
+              <a:t>цикъл</a:t>
+            </a:r>
+            <a:r>
+              <a:rPr lang="en-US" dirty="0" smtClean="0"/>
+              <a:t>.</a:t>
+            </a:r>
+            <a:br>
+              <a:rPr lang="en-US" dirty="0" smtClean="0"/>
+            </a:br>
+            <a:r>
+              <a:rPr lang="bg-BG" dirty="0" smtClean="0"/>
+              <a:t>Инициализация</a:t>
             </a:r>
             <a:endParaRPr lang="en-US" dirty="0"/>
           </a:p>
@@ -8029,7 +9568,7 @@
       </p:sp>
       <p:sp>
         <p:nvSpPr>
-          <p:cNvPr id="3" name="Content Placeholder 2"/>
+          <p:cNvPr id="5" name="Content Placeholder 4"/>
           <p:cNvSpPr>
             <a:spLocks noGrp="1"/>
           </p:cNvSpPr>
@@ -8039,152 +9578,678 @@
         </p:nvSpPr>
         <p:spPr/>
         <p:txBody>
-          <a:bodyPr anchor="ctr" anchorCtr="0">
-            <a:normAutofit fontScale="92500" lnSpcReduction="20000"/>
+          <a:bodyPr/>
+          <a:lstStyle/>
+          <a:p>
+            <a:r>
+              <a:rPr lang="bg-BG" dirty="0" smtClean="0"/>
+              <a:t>Инициализацията се извършва преди да стартира изпълнението на цикъла</a:t>
+            </a:r>
+          </a:p>
+          <a:p>
+            <a:r>
+              <a:rPr lang="bg-BG" dirty="0" smtClean="0"/>
+              <a:t>Използва се за деклариране на променливи преди да е започнало изпълнението на цикъла</a:t>
+            </a:r>
+          </a:p>
+          <a:p>
+            <a:r>
+              <a:rPr lang="bg-BG" dirty="0" smtClean="0"/>
+              <a:t>Подходящо място за инициализацията на броячи</a:t>
+            </a:r>
+            <a:endParaRPr lang="en-US" dirty="0"/>
+          </a:p>
+        </p:txBody>
+      </p:sp>
+      <p:sp>
+        <p:nvSpPr>
+          <p:cNvPr id="7" name="TextBox 6"/>
+          <p:cNvSpPr txBox="1"/>
+          <p:nvPr/>
+        </p:nvSpPr>
+        <p:spPr>
+          <a:xfrm>
+            <a:off x="8351199" y="5558135"/>
+            <a:ext cx="3428915" cy="923330"/>
+          </a:xfrm>
+          <a:prstGeom prst="rect">
+            <a:avLst/>
+          </a:prstGeom>
+        </p:spPr>
+        <p:style>
+          <a:lnRef idx="0">
+            <a:schemeClr val="accent1"/>
+          </a:lnRef>
+          <a:fillRef idx="3">
+            <a:schemeClr val="accent1"/>
+          </a:fillRef>
+          <a:effectRef idx="3">
+            <a:schemeClr val="accent1"/>
+          </a:effectRef>
+          <a:fontRef idx="minor">
+            <a:schemeClr val="lt1"/>
+          </a:fontRef>
+        </p:style>
+        <p:txBody>
+          <a:bodyPr wrap="square" rtlCol="0">
+            <a:spAutoFit/>
           </a:bodyPr>
           <a:lstStyle/>
           <a:p>
-            <a:pPr marL="457200" indent="-457200">
-              <a:buFont typeface="+mj-lt"/>
-              <a:buAutoNum type="arabicPeriod"/>
-            </a:pPr>
-            <a:r>
-              <a:rPr lang="bg-BG" dirty="0" smtClean="0"/>
-              <a:t>Напишете </a:t>
-            </a:r>
-            <a:r>
-              <a:rPr lang="en-US" dirty="0" smtClean="0"/>
-              <a:t>JS</a:t>
-            </a:r>
-            <a:r>
-              <a:rPr lang="bg-BG" dirty="0"/>
+            <a:r>
+              <a:rPr lang="en-US" dirty="0" smtClean="0">
+                <a:latin typeface="Calibri" panose="020F0502020204030204" pitchFamily="34" charset="0"/>
+              </a:rPr>
+              <a:t>for (</a:t>
+            </a:r>
+            <a:r>
+              <a:rPr lang="en-US" b="1" dirty="0" err="1" smtClean="0">
+                <a:latin typeface="Calibri" panose="020F0502020204030204" pitchFamily="34" charset="0"/>
+              </a:rPr>
+              <a:t>var</a:t>
+            </a:r>
+            <a:r>
+              <a:rPr lang="en-US" b="1" dirty="0" smtClean="0">
+                <a:latin typeface="Calibri" panose="020F0502020204030204" pitchFamily="34" charset="0"/>
+              </a:rPr>
               <a:t> </a:t>
             </a:r>
             <a:r>
-              <a:rPr lang="bg-BG" dirty="0" smtClean="0"/>
-              <a:t>код, който по зададена цифра, изписва нейното наименование. Например: 1 -&gt; </a:t>
-            </a:r>
-            <a:r>
-              <a:rPr lang="en-US" dirty="0" smtClean="0"/>
-              <a:t>one</a:t>
-            </a:r>
-            <a:endParaRPr lang="bg-BG" dirty="0" smtClean="0"/>
-          </a:p>
-          <a:p>
-            <a:pPr marL="457200" indent="-457200">
-              <a:buFont typeface="+mj-lt"/>
-              <a:buAutoNum type="arabicPeriod"/>
-            </a:pPr>
-            <a:r>
-              <a:rPr lang="bg-BG" dirty="0" smtClean="0"/>
-              <a:t>Напишете </a:t>
-            </a:r>
-            <a:r>
-              <a:rPr lang="en-US" dirty="0" smtClean="0"/>
-              <a:t>JS </a:t>
-            </a:r>
-            <a:r>
-              <a:rPr lang="bg-BG" dirty="0" smtClean="0"/>
-              <a:t>код, който по задедени 3 числа намира най-малкото</a:t>
-            </a:r>
-          </a:p>
-          <a:p>
-            <a:pPr marL="457200" indent="-457200">
-              <a:buFont typeface="+mj-lt"/>
-              <a:buAutoNum type="arabicPeriod"/>
-            </a:pPr>
-            <a:r>
-              <a:rPr lang="bg-BG" dirty="0" smtClean="0"/>
-              <a:t>Напишете </a:t>
-            </a:r>
-            <a:r>
-              <a:rPr lang="en-US" dirty="0" smtClean="0"/>
-              <a:t>JS</a:t>
-            </a:r>
-            <a:r>
-              <a:rPr lang="bg-BG" dirty="0" smtClean="0"/>
-              <a:t> код, който сортира 3 числа във възходящ ред</a:t>
-            </a:r>
-          </a:p>
-          <a:p>
-            <a:pPr marL="457200" indent="-457200">
-              <a:buFont typeface="+mj-lt"/>
-              <a:buAutoNum type="arabicPeriod"/>
-            </a:pPr>
-            <a:r>
-              <a:rPr lang="bg-BG" dirty="0" smtClean="0"/>
-              <a:t>Напишете </a:t>
-            </a:r>
-            <a:r>
-              <a:rPr lang="en-US" dirty="0" smtClean="0"/>
-              <a:t>JS</a:t>
-            </a:r>
-            <a:r>
-              <a:rPr lang="bg-BG" dirty="0" smtClean="0"/>
-              <a:t> код, който да намира корените на квадратно уварниение</a:t>
-            </a:r>
-            <a:r>
-              <a:rPr lang="en-US" dirty="0" smtClean="0"/>
-              <a:t>           ax^2 + </a:t>
-            </a:r>
-            <a:r>
-              <a:rPr lang="en-US" dirty="0" err="1" smtClean="0"/>
-              <a:t>bx</a:t>
-            </a:r>
-            <a:r>
-              <a:rPr lang="en-US" dirty="0" smtClean="0"/>
-              <a:t> + c = 0 </a:t>
-            </a:r>
-            <a:r>
-              <a:rPr lang="bg-BG" dirty="0" smtClean="0"/>
-              <a:t>по зададени</a:t>
-            </a:r>
-            <a:r>
-              <a:rPr lang="en-US" dirty="0" smtClean="0"/>
-              <a:t> a, b </a:t>
-            </a:r>
-            <a:r>
-              <a:rPr lang="bg-BG" dirty="0" smtClean="0"/>
-              <a:t>и </a:t>
-            </a:r>
-            <a:r>
-              <a:rPr lang="en-US" dirty="0" smtClean="0"/>
-              <a:t>c. </a:t>
-            </a:r>
-            <a:r>
-              <a:rPr lang="bg-BG" dirty="0" smtClean="0"/>
-              <a:t>*Заб.: Квадратното уравнение може да има 0,1 или 2 реални корена</a:t>
-            </a:r>
-          </a:p>
-          <a:p>
-            <a:pPr marL="457200" indent="-457200">
-              <a:buFont typeface="+mj-lt"/>
-              <a:buAutoNum type="arabicPeriod"/>
-            </a:pPr>
-            <a:r>
-              <a:rPr lang="bg-BG" dirty="0" smtClean="0"/>
-              <a:t>*Напишете програма, която конвертира дадено 3-цифрено число към неговата текстова репрезентация. Напр.: </a:t>
-            </a:r>
-            <a:r>
-              <a:rPr lang="en-US" dirty="0" smtClean="0"/>
-              <a:t>312 </a:t>
-            </a:r>
-            <a:r>
-              <a:rPr lang="bg-BG" dirty="0" smtClean="0"/>
-              <a:t>-&gt; </a:t>
-            </a:r>
-            <a:r>
-              <a:rPr lang="en-US" dirty="0" smtClean="0"/>
-              <a:t>three hundred and twelve</a:t>
-            </a:r>
-            <a:endParaRPr lang="en-US" dirty="0"/>
+              <a:rPr lang="en-US" b="1" dirty="0" err="1" smtClean="0">
+                <a:latin typeface="Calibri" panose="020F0502020204030204" pitchFamily="34" charset="0"/>
+              </a:rPr>
+              <a:t>i</a:t>
+            </a:r>
+            <a:r>
+              <a:rPr lang="en-US" b="1" dirty="0" smtClean="0">
+                <a:latin typeface="Calibri" panose="020F0502020204030204" pitchFamily="34" charset="0"/>
+              </a:rPr>
+              <a:t> = 0</a:t>
+            </a:r>
+            <a:r>
+              <a:rPr lang="en-US" dirty="0" smtClean="0">
+                <a:latin typeface="Calibri" panose="020F0502020204030204" pitchFamily="34" charset="0"/>
+              </a:rPr>
+              <a:t>; </a:t>
+            </a:r>
+            <a:r>
+              <a:rPr lang="en-US" dirty="0" err="1" smtClean="0">
+                <a:latin typeface="Calibri" panose="020F0502020204030204" pitchFamily="34" charset="0"/>
+              </a:rPr>
+              <a:t>i</a:t>
+            </a:r>
+            <a:r>
+              <a:rPr lang="en-US" dirty="0" smtClean="0">
+                <a:latin typeface="Calibri" panose="020F0502020204030204" pitchFamily="34" charset="0"/>
+              </a:rPr>
+              <a:t> &lt; 10; </a:t>
+            </a:r>
+            <a:r>
+              <a:rPr lang="en-US" dirty="0" err="1" smtClean="0">
+                <a:latin typeface="Calibri" panose="020F0502020204030204" pitchFamily="34" charset="0"/>
+              </a:rPr>
+              <a:t>i</a:t>
+            </a:r>
+            <a:r>
+              <a:rPr lang="en-US" dirty="0" smtClean="0">
+                <a:latin typeface="Calibri" panose="020F0502020204030204" pitchFamily="34" charset="0"/>
+              </a:rPr>
+              <a:t>++</a:t>
+            </a:r>
+            <a:r>
+              <a:rPr lang="en-US" dirty="0" smtClean="0">
+                <a:latin typeface="Calibri" panose="020F0502020204030204" pitchFamily="34" charset="0"/>
+              </a:rPr>
+              <a:t>) {</a:t>
+            </a:r>
+          </a:p>
+          <a:p>
+            <a:r>
+              <a:rPr lang="en-US" dirty="0">
+                <a:latin typeface="Calibri" panose="020F0502020204030204" pitchFamily="34" charset="0"/>
+              </a:rPr>
+              <a:t> </a:t>
+            </a:r>
+            <a:r>
+              <a:rPr lang="en-US" dirty="0" smtClean="0">
+                <a:latin typeface="Calibri" panose="020F0502020204030204" pitchFamily="34" charset="0"/>
+              </a:rPr>
+              <a:t>     // loop body</a:t>
+            </a:r>
+          </a:p>
+          <a:p>
+            <a:r>
+              <a:rPr lang="en-US" dirty="0">
+                <a:latin typeface="Calibri" panose="020F0502020204030204" pitchFamily="34" charset="0"/>
+              </a:rPr>
+              <a:t>}</a:t>
+            </a:r>
+            <a:endParaRPr lang="en-US" dirty="0" smtClean="0">
+              <a:latin typeface="Calibri" panose="020F0502020204030204" pitchFamily="34" charset="0"/>
+            </a:endParaRPr>
           </a:p>
         </p:txBody>
       </p:sp>
     </p:spTree>
     <p:extLst>
       <p:ext uri="{BB962C8B-B14F-4D97-AF65-F5344CB8AC3E}">
-        <p14:creationId xmlns:p14="http://schemas.microsoft.com/office/powerpoint/2010/main" val="2161688977"/>
+        <p14:creationId xmlns:p14="http://schemas.microsoft.com/office/powerpoint/2010/main" val="3443042340"/>
+      </p:ext>
+    </p:extLst>
+  </p:cSld>
+  <p:clrMapOvr>
+    <a:masterClrMapping/>
+  </p:clrMapOvr>
+</p:sld>
+</file>
+
+<file path=ppt/slides/slide8.xml><?xml version="1.0" encoding="utf-8"?>
+<p:sld xmlns:a="http://schemas.openxmlformats.org/drawingml/2006/main" xmlns:r="http://schemas.openxmlformats.org/officeDocument/2006/relationships" xmlns:p="http://schemas.openxmlformats.org/presentationml/2006/main">
+  <p:cSld>
+    <p:spTree>
+      <p:nvGrpSpPr>
+        <p:cNvPr id="1" name=""/>
+        <p:cNvGrpSpPr/>
+        <p:nvPr/>
+      </p:nvGrpSpPr>
+      <p:grpSpPr>
+        <a:xfrm>
+          <a:off x="0" y="0"/>
+          <a:ext cx="0" cy="0"/>
+          <a:chOff x="0" y="0"/>
+          <a:chExt cx="0" cy="0"/>
+        </a:xfrm>
+      </p:grpSpPr>
+      <p:sp>
+        <p:nvSpPr>
+          <p:cNvPr id="2" name="Title 1"/>
+          <p:cNvSpPr>
+            <a:spLocks noGrp="1"/>
+          </p:cNvSpPr>
+          <p:nvPr>
+            <p:ph type="title"/>
+          </p:nvPr>
+        </p:nvSpPr>
+        <p:spPr/>
+        <p:txBody>
+          <a:bodyPr/>
+          <a:lstStyle/>
+          <a:p>
+            <a:r>
+              <a:rPr lang="en-US" i="1" dirty="0">
+                <a:solidFill>
+                  <a:schemeClr val="accent6">
+                    <a:lumMod val="75000"/>
+                  </a:schemeClr>
+                </a:solidFill>
+              </a:rPr>
+              <a:t>f</a:t>
+            </a:r>
+            <a:r>
+              <a:rPr lang="en-US" i="1" dirty="0" smtClean="0">
+                <a:solidFill>
+                  <a:schemeClr val="accent6">
+                    <a:lumMod val="75000"/>
+                  </a:schemeClr>
+                </a:solidFill>
+              </a:rPr>
+              <a:t>or</a:t>
+            </a:r>
+            <a:r>
+              <a:rPr lang="en-US" dirty="0" smtClean="0"/>
+              <a:t>-</a:t>
+            </a:r>
+            <a:r>
+              <a:rPr lang="bg-BG" dirty="0" smtClean="0"/>
+              <a:t>цикъл</a:t>
+            </a:r>
+            <a:r>
+              <a:rPr lang="en-US" dirty="0" smtClean="0"/>
+              <a:t>.</a:t>
+            </a:r>
+            <a:br>
+              <a:rPr lang="en-US" dirty="0" smtClean="0"/>
+            </a:br>
+            <a:r>
+              <a:rPr lang="bg-BG" dirty="0" smtClean="0"/>
+              <a:t>Проверка</a:t>
+            </a:r>
+            <a:endParaRPr lang="en-US" dirty="0"/>
+          </a:p>
+        </p:txBody>
+      </p:sp>
+      <p:sp>
+        <p:nvSpPr>
+          <p:cNvPr id="5" name="Content Placeholder 4"/>
+          <p:cNvSpPr>
+            <a:spLocks noGrp="1"/>
+          </p:cNvSpPr>
+          <p:nvPr>
+            <p:ph idx="1"/>
+          </p:nvPr>
+        </p:nvSpPr>
+        <p:spPr/>
+        <p:txBody>
+          <a:bodyPr/>
+          <a:lstStyle/>
+          <a:p>
+            <a:r>
+              <a:rPr lang="bg-BG" dirty="0" smtClean="0"/>
+              <a:t>Оценява се преди всяка итерация на цикъла</a:t>
+            </a:r>
+          </a:p>
+          <a:p>
+            <a:pPr lvl="1"/>
+            <a:r>
+              <a:rPr lang="bg-BG" dirty="0" smtClean="0"/>
+              <a:t>Ако условието е изпълнено, изпълнява се тялото на цикъла</a:t>
+            </a:r>
+          </a:p>
+          <a:p>
+            <a:pPr lvl="1"/>
+            <a:r>
+              <a:rPr lang="bg-BG" dirty="0" smtClean="0"/>
+              <a:t>Ако условието </a:t>
+            </a:r>
+            <a:r>
+              <a:rPr lang="bg-BG" b="1" dirty="0" smtClean="0"/>
+              <a:t>не е </a:t>
+            </a:r>
+            <a:r>
+              <a:rPr lang="bg-BG" dirty="0" smtClean="0"/>
+              <a:t> изпълнено, </a:t>
+            </a:r>
+            <a:r>
+              <a:rPr lang="bg-BG" b="1" dirty="0" smtClean="0"/>
+              <a:t>не се </a:t>
+            </a:r>
+            <a:r>
+              <a:rPr lang="bg-BG" dirty="0" smtClean="0"/>
+              <a:t>изпълнява тялото на цикъла</a:t>
+            </a:r>
+            <a:endParaRPr lang="en-US" dirty="0"/>
+          </a:p>
+        </p:txBody>
+      </p:sp>
+      <p:sp>
+        <p:nvSpPr>
+          <p:cNvPr id="7" name="TextBox 6"/>
+          <p:cNvSpPr txBox="1"/>
+          <p:nvPr/>
+        </p:nvSpPr>
+        <p:spPr>
+          <a:xfrm>
+            <a:off x="8351199" y="5558135"/>
+            <a:ext cx="3428915" cy="923330"/>
+          </a:xfrm>
+          <a:prstGeom prst="rect">
+            <a:avLst/>
+          </a:prstGeom>
+        </p:spPr>
+        <p:style>
+          <a:lnRef idx="0">
+            <a:schemeClr val="accent1"/>
+          </a:lnRef>
+          <a:fillRef idx="3">
+            <a:schemeClr val="accent1"/>
+          </a:fillRef>
+          <a:effectRef idx="3">
+            <a:schemeClr val="accent1"/>
+          </a:effectRef>
+          <a:fontRef idx="minor">
+            <a:schemeClr val="lt1"/>
+          </a:fontRef>
+        </p:style>
+        <p:txBody>
+          <a:bodyPr wrap="square" rtlCol="0">
+            <a:spAutoFit/>
+          </a:bodyPr>
+          <a:lstStyle/>
+          <a:p>
+            <a:r>
+              <a:rPr lang="en-US" dirty="0" smtClean="0">
+                <a:latin typeface="Calibri" panose="020F0502020204030204" pitchFamily="34" charset="0"/>
+              </a:rPr>
+              <a:t>for (</a:t>
+            </a:r>
+            <a:r>
+              <a:rPr lang="en-US" dirty="0" err="1" smtClean="0">
+                <a:latin typeface="Calibri" panose="020F0502020204030204" pitchFamily="34" charset="0"/>
+              </a:rPr>
+              <a:t>var</a:t>
+            </a:r>
+            <a:r>
+              <a:rPr lang="en-US" dirty="0" smtClean="0">
+                <a:latin typeface="Calibri" panose="020F0502020204030204" pitchFamily="34" charset="0"/>
+              </a:rPr>
+              <a:t> </a:t>
+            </a:r>
+            <a:r>
+              <a:rPr lang="en-US" dirty="0" err="1" smtClean="0">
+                <a:latin typeface="Calibri" panose="020F0502020204030204" pitchFamily="34" charset="0"/>
+              </a:rPr>
+              <a:t>i</a:t>
+            </a:r>
+            <a:r>
+              <a:rPr lang="en-US" dirty="0" smtClean="0">
+                <a:latin typeface="Calibri" panose="020F0502020204030204" pitchFamily="34" charset="0"/>
+              </a:rPr>
+              <a:t> = 0; </a:t>
+            </a:r>
+            <a:r>
+              <a:rPr lang="en-US" b="1" dirty="0" err="1" smtClean="0">
+                <a:latin typeface="Calibri" panose="020F0502020204030204" pitchFamily="34" charset="0"/>
+              </a:rPr>
+              <a:t>i</a:t>
+            </a:r>
+            <a:r>
+              <a:rPr lang="en-US" b="1" dirty="0" smtClean="0">
+                <a:latin typeface="Calibri" panose="020F0502020204030204" pitchFamily="34" charset="0"/>
+              </a:rPr>
+              <a:t> &lt; 10</a:t>
+            </a:r>
+            <a:r>
+              <a:rPr lang="en-US" dirty="0" smtClean="0">
+                <a:latin typeface="Calibri" panose="020F0502020204030204" pitchFamily="34" charset="0"/>
+              </a:rPr>
+              <a:t>; </a:t>
+            </a:r>
+            <a:r>
+              <a:rPr lang="en-US" dirty="0" err="1" smtClean="0">
+                <a:latin typeface="Calibri" panose="020F0502020204030204" pitchFamily="34" charset="0"/>
+              </a:rPr>
+              <a:t>i</a:t>
+            </a:r>
+            <a:r>
+              <a:rPr lang="en-US" dirty="0" smtClean="0">
+                <a:latin typeface="Calibri" panose="020F0502020204030204" pitchFamily="34" charset="0"/>
+              </a:rPr>
+              <a:t>++</a:t>
+            </a:r>
+            <a:r>
+              <a:rPr lang="en-US" dirty="0" smtClean="0">
+                <a:latin typeface="Calibri" panose="020F0502020204030204" pitchFamily="34" charset="0"/>
+              </a:rPr>
+              <a:t>) {</a:t>
+            </a:r>
+          </a:p>
+          <a:p>
+            <a:r>
+              <a:rPr lang="en-US" dirty="0">
+                <a:latin typeface="Calibri" panose="020F0502020204030204" pitchFamily="34" charset="0"/>
+              </a:rPr>
+              <a:t> </a:t>
+            </a:r>
+            <a:r>
+              <a:rPr lang="en-US" dirty="0" smtClean="0">
+                <a:latin typeface="Calibri" panose="020F0502020204030204" pitchFamily="34" charset="0"/>
+              </a:rPr>
+              <a:t>     // loop body</a:t>
+            </a:r>
+          </a:p>
+          <a:p>
+            <a:r>
+              <a:rPr lang="en-US" dirty="0">
+                <a:latin typeface="Calibri" panose="020F0502020204030204" pitchFamily="34" charset="0"/>
+              </a:rPr>
+              <a:t>}</a:t>
+            </a:r>
+            <a:endParaRPr lang="en-US" dirty="0" smtClean="0">
+              <a:latin typeface="Calibri" panose="020F0502020204030204" pitchFamily="34" charset="0"/>
+            </a:endParaRPr>
+          </a:p>
+        </p:txBody>
+      </p:sp>
+    </p:spTree>
+    <p:extLst>
+      <p:ext uri="{BB962C8B-B14F-4D97-AF65-F5344CB8AC3E}">
+        <p14:creationId xmlns:p14="http://schemas.microsoft.com/office/powerpoint/2010/main" val="3180374469"/>
+      </p:ext>
+    </p:extLst>
+  </p:cSld>
+  <p:clrMapOvr>
+    <a:masterClrMapping/>
+  </p:clrMapOvr>
+</p:sld>
+</file>
+
+<file path=ppt/slides/slide9.xml><?xml version="1.0" encoding="utf-8"?>
+<p:sld xmlns:a="http://schemas.openxmlformats.org/drawingml/2006/main" xmlns:r="http://schemas.openxmlformats.org/officeDocument/2006/relationships" xmlns:p="http://schemas.openxmlformats.org/presentationml/2006/main">
+  <p:cSld>
+    <p:spTree>
+      <p:nvGrpSpPr>
+        <p:cNvPr id="1" name=""/>
+        <p:cNvGrpSpPr/>
+        <p:nvPr/>
+      </p:nvGrpSpPr>
+      <p:grpSpPr>
+        <a:xfrm>
+          <a:off x="0" y="0"/>
+          <a:ext cx="0" cy="0"/>
+          <a:chOff x="0" y="0"/>
+          <a:chExt cx="0" cy="0"/>
+        </a:xfrm>
+      </p:grpSpPr>
+      <p:sp>
+        <p:nvSpPr>
+          <p:cNvPr id="2" name="Title 1"/>
+          <p:cNvSpPr>
+            <a:spLocks noGrp="1"/>
+          </p:cNvSpPr>
+          <p:nvPr>
+            <p:ph type="title"/>
+          </p:nvPr>
+        </p:nvSpPr>
+        <p:spPr/>
+        <p:txBody>
+          <a:bodyPr/>
+          <a:lstStyle/>
+          <a:p>
+            <a:r>
+              <a:rPr lang="en-US" i="1" dirty="0">
+                <a:solidFill>
+                  <a:schemeClr val="accent6">
+                    <a:lumMod val="75000"/>
+                  </a:schemeClr>
+                </a:solidFill>
+              </a:rPr>
+              <a:t>f</a:t>
+            </a:r>
+            <a:r>
+              <a:rPr lang="en-US" i="1" dirty="0" smtClean="0">
+                <a:solidFill>
+                  <a:schemeClr val="accent6">
+                    <a:lumMod val="75000"/>
+                  </a:schemeClr>
+                </a:solidFill>
+              </a:rPr>
+              <a:t>or</a:t>
+            </a:r>
+            <a:r>
+              <a:rPr lang="en-US" dirty="0" smtClean="0"/>
+              <a:t>-</a:t>
+            </a:r>
+            <a:r>
+              <a:rPr lang="bg-BG" dirty="0" smtClean="0"/>
+              <a:t>цикъл</a:t>
+            </a:r>
+            <a:r>
+              <a:rPr lang="en-US" dirty="0" smtClean="0"/>
+              <a:t>.</a:t>
+            </a:r>
+            <a:br>
+              <a:rPr lang="en-US" dirty="0" smtClean="0"/>
+            </a:br>
+            <a:r>
+              <a:rPr lang="bg-BG" dirty="0" smtClean="0"/>
+              <a:t>Обновление</a:t>
+            </a:r>
+            <a:endParaRPr lang="en-US" dirty="0"/>
+          </a:p>
+        </p:txBody>
+      </p:sp>
+      <p:sp>
+        <p:nvSpPr>
+          <p:cNvPr id="5" name="Content Placeholder 4"/>
+          <p:cNvSpPr>
+            <a:spLocks noGrp="1"/>
+          </p:cNvSpPr>
+          <p:nvPr>
+            <p:ph idx="1"/>
+          </p:nvPr>
+        </p:nvSpPr>
+        <p:spPr/>
+        <p:txBody>
+          <a:bodyPr/>
+          <a:lstStyle/>
+          <a:p>
+            <a:r>
+              <a:rPr lang="bg-BG" dirty="0" smtClean="0"/>
+              <a:t>Изпълнява се всеки път след като се е изпълнило тялото на цикъла</a:t>
+            </a:r>
+          </a:p>
+          <a:p>
+            <a:r>
+              <a:rPr lang="bg-BG" dirty="0" smtClean="0"/>
+              <a:t>Изпълнява се преди да се направи оценка на условието</a:t>
+            </a:r>
+          </a:p>
+          <a:p>
+            <a:r>
+              <a:rPr lang="bg-BG" dirty="0" smtClean="0"/>
+              <a:t>Подходящо е да се обновява стойноста на брояча</a:t>
+            </a:r>
+            <a:endParaRPr lang="en-US" dirty="0"/>
+          </a:p>
+        </p:txBody>
+      </p:sp>
+      <p:sp>
+        <p:nvSpPr>
+          <p:cNvPr id="7" name="TextBox 6"/>
+          <p:cNvSpPr txBox="1"/>
+          <p:nvPr/>
+        </p:nvSpPr>
+        <p:spPr>
+          <a:xfrm>
+            <a:off x="8351199" y="5558135"/>
+            <a:ext cx="3428915" cy="923330"/>
+          </a:xfrm>
+          <a:prstGeom prst="rect">
+            <a:avLst/>
+          </a:prstGeom>
+        </p:spPr>
+        <p:style>
+          <a:lnRef idx="0">
+            <a:schemeClr val="accent1"/>
+          </a:lnRef>
+          <a:fillRef idx="3">
+            <a:schemeClr val="accent1"/>
+          </a:fillRef>
+          <a:effectRef idx="3">
+            <a:schemeClr val="accent1"/>
+          </a:effectRef>
+          <a:fontRef idx="minor">
+            <a:schemeClr val="lt1"/>
+          </a:fontRef>
+        </p:style>
+        <p:txBody>
+          <a:bodyPr wrap="square" rtlCol="0">
+            <a:spAutoFit/>
+          </a:bodyPr>
+          <a:lstStyle/>
+          <a:p>
+            <a:r>
+              <a:rPr lang="en-US" dirty="0" smtClean="0">
+                <a:latin typeface="Calibri" panose="020F0502020204030204" pitchFamily="34" charset="0"/>
+              </a:rPr>
+              <a:t>for (</a:t>
+            </a:r>
+            <a:r>
+              <a:rPr lang="en-US" dirty="0" err="1" smtClean="0">
+                <a:latin typeface="Calibri" panose="020F0502020204030204" pitchFamily="34" charset="0"/>
+              </a:rPr>
+              <a:t>var</a:t>
+            </a:r>
+            <a:r>
+              <a:rPr lang="en-US" dirty="0" smtClean="0">
+                <a:latin typeface="Calibri" panose="020F0502020204030204" pitchFamily="34" charset="0"/>
+              </a:rPr>
+              <a:t> </a:t>
+            </a:r>
+            <a:r>
+              <a:rPr lang="en-US" dirty="0" err="1" smtClean="0">
+                <a:latin typeface="Calibri" panose="020F0502020204030204" pitchFamily="34" charset="0"/>
+              </a:rPr>
+              <a:t>i</a:t>
+            </a:r>
+            <a:r>
+              <a:rPr lang="en-US" dirty="0" smtClean="0">
+                <a:latin typeface="Calibri" panose="020F0502020204030204" pitchFamily="34" charset="0"/>
+              </a:rPr>
+              <a:t> = 0; </a:t>
+            </a:r>
+            <a:r>
+              <a:rPr lang="en-US" dirty="0" err="1" smtClean="0">
+                <a:latin typeface="Calibri" panose="020F0502020204030204" pitchFamily="34" charset="0"/>
+              </a:rPr>
+              <a:t>i</a:t>
+            </a:r>
+            <a:r>
+              <a:rPr lang="en-US" dirty="0" smtClean="0">
+                <a:latin typeface="Calibri" panose="020F0502020204030204" pitchFamily="34" charset="0"/>
+              </a:rPr>
+              <a:t> &lt; 10; </a:t>
+            </a:r>
+            <a:r>
+              <a:rPr lang="en-US" b="1" dirty="0" err="1" smtClean="0">
+                <a:latin typeface="Calibri" panose="020F0502020204030204" pitchFamily="34" charset="0"/>
+              </a:rPr>
+              <a:t>i</a:t>
+            </a:r>
+            <a:r>
+              <a:rPr lang="en-US" b="1" dirty="0" smtClean="0">
+                <a:latin typeface="Calibri" panose="020F0502020204030204" pitchFamily="34" charset="0"/>
+              </a:rPr>
+              <a:t>++</a:t>
+            </a:r>
+            <a:r>
+              <a:rPr lang="en-US" dirty="0" smtClean="0">
+                <a:latin typeface="Calibri" panose="020F0502020204030204" pitchFamily="34" charset="0"/>
+              </a:rPr>
+              <a:t>) {</a:t>
+            </a:r>
+          </a:p>
+          <a:p>
+            <a:r>
+              <a:rPr lang="en-US" dirty="0">
+                <a:latin typeface="Calibri" panose="020F0502020204030204" pitchFamily="34" charset="0"/>
+              </a:rPr>
+              <a:t> </a:t>
+            </a:r>
+            <a:r>
+              <a:rPr lang="en-US" dirty="0" smtClean="0">
+                <a:latin typeface="Calibri" panose="020F0502020204030204" pitchFamily="34" charset="0"/>
+              </a:rPr>
+              <a:t>     // loop body</a:t>
+            </a:r>
+          </a:p>
+          <a:p>
+            <a:r>
+              <a:rPr lang="en-US" dirty="0">
+                <a:latin typeface="Calibri" panose="020F0502020204030204" pitchFamily="34" charset="0"/>
+              </a:rPr>
+              <a:t>}</a:t>
+            </a:r>
+            <a:endParaRPr lang="en-US" dirty="0" smtClean="0">
+              <a:latin typeface="Calibri" panose="020F0502020204030204" pitchFamily="34" charset="0"/>
+            </a:endParaRPr>
+          </a:p>
+        </p:txBody>
+      </p:sp>
+    </p:spTree>
+    <p:extLst>
+      <p:ext uri="{BB962C8B-B14F-4D97-AF65-F5344CB8AC3E}">
+        <p14:creationId xmlns:p14="http://schemas.microsoft.com/office/powerpoint/2010/main" val="4289818891"/>
       </p:ext>
     </p:extLst>
   </p:cSld>
@@ -8448,4 +10513,265 @@
     </a:ext>
   </a:extLst>
 </a:theme>
+</file>
+
+<file path=ppt/theme/theme2.xml><?xml version="1.0" encoding="utf-8"?>
+<a:theme xmlns:a="http://schemas.openxmlformats.org/drawingml/2006/main" name="Office Theme">
+  <a:themeElements>
+    <a:clrScheme name="Office">
+      <a:dk1>
+        <a:sysClr val="windowText" lastClr="000000"/>
+      </a:dk1>
+      <a:lt1>
+        <a:sysClr val="window" lastClr="FFFFFF"/>
+      </a:lt1>
+      <a:dk2>
+        <a:srgbClr val="44546A"/>
+      </a:dk2>
+      <a:lt2>
+        <a:srgbClr val="E7E6E6"/>
+      </a:lt2>
+      <a:accent1>
+        <a:srgbClr val="5B9BD5"/>
+      </a:accent1>
+      <a:accent2>
+        <a:srgbClr val="ED7D31"/>
+      </a:accent2>
+      <a:accent3>
+        <a:srgbClr val="A5A5A5"/>
+      </a:accent3>
+      <a:accent4>
+        <a:srgbClr val="FFC000"/>
+      </a:accent4>
+      <a:accent5>
+        <a:srgbClr val="4472C4"/>
+      </a:accent5>
+      <a:accent6>
+        <a:srgbClr val="70AD47"/>
+      </a:accent6>
+      <a:hlink>
+        <a:srgbClr val="0563C1"/>
+      </a:hlink>
+      <a:folHlink>
+        <a:srgbClr val="954F72"/>
+      </a:folHlink>
+    </a:clrScheme>
+    <a:fontScheme name="Office">
+      <a:majorFont>
+        <a:latin typeface="Calibri Light" panose="020F0302020204030204"/>
+        <a:ea typeface=""/>
+        <a:cs typeface=""/>
+        <a:font script="Jpan" typeface="ＭＳ Ｐゴシック"/>
+        <a:font script="Hang" typeface="맑은 고딕"/>
+        <a:font script="Hans" typeface="宋体"/>
+        <a:font script="Hant" typeface="新細明體"/>
+        <a:font script="Arab" typeface="Times New Roman"/>
+        <a:font script="Hebr" typeface="Times New Roman"/>
+        <a:font script="Thai" typeface="Angsana New"/>
+        <a:font script="Ethi" typeface="Nyala"/>
+        <a:font script="Beng" typeface="Vrinda"/>
+        <a:font script="Gujr" typeface="Shruti"/>
+        <a:font script="Khmr" typeface="MoolBoran"/>
+        <a:font script="Knda" typeface="Tunga"/>
+        <a:font script="Guru" typeface="Raavi"/>
+        <a:font script="Cans" typeface="Euphemia"/>
+        <a:font script="Cher" typeface="Plantagenet Cherokee"/>
+        <a:font script="Yiii" typeface="Microsoft Yi Baiti"/>
+        <a:font script="Tibt" typeface="Microsoft Himalaya"/>
+        <a:font script="Thaa" typeface="MV Boli"/>
+        <a:font script="Deva" typeface="Mangal"/>
+        <a:font script="Telu" typeface="Gautami"/>
+        <a:font script="Taml" typeface="Latha"/>
+        <a:font script="Syrc" typeface="Estrangelo Edessa"/>
+        <a:font script="Orya" typeface="Kalinga"/>
+        <a:font script="Mlym" typeface="Kartika"/>
+        <a:font script="Laoo" typeface="DokChampa"/>
+        <a:font script="Sinh" typeface="Iskoola Pota"/>
+        <a:font script="Mong" typeface="Mongolian Baiti"/>
+        <a:font script="Viet" typeface="Times New Roman"/>
+        <a:font script="Uigh" typeface="Microsoft Uighur"/>
+        <a:font script="Geor" typeface="Sylfaen"/>
+      </a:majorFont>
+      <a:minorFont>
+        <a:latin typeface="Calibri" panose="020F0502020204030204"/>
+        <a:ea typeface=""/>
+        <a:cs typeface=""/>
+        <a:font script="Jpan" typeface="ＭＳ Ｐゴシック"/>
+        <a:font script="Hang" typeface="맑은 고딕"/>
+        <a:font script="Hans" typeface="宋体"/>
+        <a:font script="Hant" typeface="新細明體"/>
+        <a:font script="Arab" typeface="Arial"/>
+        <a:font script="Hebr" typeface="Arial"/>
+        <a:font script="Thai" typeface="Cordia New"/>
+        <a:font script="Ethi" typeface="Nyala"/>
+        <a:font script="Beng" typeface="Vrinda"/>
+        <a:font script="Gujr" typeface="Shruti"/>
+        <a:font script="Khmr" typeface="DaunPenh"/>
+        <a:font script="Knda" typeface="Tunga"/>
+        <a:font script="Guru" typeface="Raavi"/>
+        <a:font script="Cans" typeface="Euphemia"/>
+        <a:font script="Cher" typeface="Plantagenet Cherokee"/>
+        <a:font script="Yiii" typeface="Microsoft Yi Baiti"/>
+        <a:font script="Tibt" typeface="Microsoft Himalaya"/>
+        <a:font script="Thaa" typeface="MV Boli"/>
+        <a:font script="Deva" typeface="Mangal"/>
+        <a:font script="Telu" typeface="Gautami"/>
+        <a:font script="Taml" typeface="Latha"/>
+        <a:font script="Syrc" typeface="Estrangelo Edessa"/>
+        <a:font script="Orya" typeface="Kalinga"/>
+        <a:font script="Mlym" typeface="Kartika"/>
+        <a:font script="Laoo" typeface="DokChampa"/>
+        <a:font script="Sinh" typeface="Iskoola Pota"/>
+        <a:font script="Mong" typeface="Mongolian Baiti"/>
+        <a:font script="Viet" typeface="Arial"/>
+        <a:font script="Uigh" typeface="Microsoft Uighur"/>
+        <a:font script="Geor" typeface="Sylfaen"/>
+      </a:minorFont>
+    </a:fontScheme>
+    <a:fmtScheme name="Office">
+      <a:fillStyleLst>
+        <a:solidFill>
+          <a:schemeClr val="phClr"/>
+        </a:solidFill>
+        <a:gradFill rotWithShape="1">
+          <a:gsLst>
+            <a:gs pos="0">
+              <a:schemeClr val="phClr">
+                <a:lumMod val="110000"/>
+                <a:satMod val="105000"/>
+                <a:tint val="67000"/>
+              </a:schemeClr>
+            </a:gs>
+            <a:gs pos="50000">
+              <a:schemeClr val="phClr">
+                <a:lumMod val="105000"/>
+                <a:satMod val="103000"/>
+                <a:tint val="73000"/>
+              </a:schemeClr>
+            </a:gs>
+            <a:gs pos="100000">
+              <a:schemeClr val="phClr">
+                <a:lumMod val="105000"/>
+                <a:satMod val="109000"/>
+                <a:tint val="81000"/>
+              </a:schemeClr>
+            </a:gs>
+          </a:gsLst>
+          <a:lin ang="5400000" scaled="0"/>
+        </a:gradFill>
+        <a:gradFill rotWithShape="1">
+          <a:gsLst>
+            <a:gs pos="0">
+              <a:schemeClr val="phClr">
+                <a:satMod val="103000"/>
+                <a:lumMod val="102000"/>
+                <a:tint val="94000"/>
+              </a:schemeClr>
+            </a:gs>
+            <a:gs pos="50000">
+              <a:schemeClr val="phClr">
+                <a:satMod val="110000"/>
+                <a:lumMod val="100000"/>
+                <a:shade val="100000"/>
+              </a:schemeClr>
+            </a:gs>
+            <a:gs pos="100000">
+              <a:schemeClr val="phClr">
+                <a:lumMod val="99000"/>
+                <a:satMod val="120000"/>
+                <a:shade val="78000"/>
+              </a:schemeClr>
+            </a:gs>
+          </a:gsLst>
+          <a:lin ang="5400000" scaled="0"/>
+        </a:gradFill>
+      </a:fillStyleLst>
+      <a:lnStyleLst>
+        <a:ln w="6350" cap="flat" cmpd="sng" algn="ctr">
+          <a:solidFill>
+            <a:schemeClr val="phClr"/>
+          </a:solidFill>
+          <a:prstDash val="solid"/>
+          <a:miter lim="800000"/>
+        </a:ln>
+        <a:ln w="12700" cap="flat" cmpd="sng" algn="ctr">
+          <a:solidFill>
+            <a:schemeClr val="phClr"/>
+          </a:solidFill>
+          <a:prstDash val="solid"/>
+          <a:miter lim="800000"/>
+        </a:ln>
+        <a:ln w="19050" cap="flat" cmpd="sng" algn="ctr">
+          <a:solidFill>
+            <a:schemeClr val="phClr"/>
+          </a:solidFill>
+          <a:prstDash val="solid"/>
+          <a:miter lim="800000"/>
+        </a:ln>
+      </a:lnStyleLst>
+      <a:effectStyleLst>
+        <a:effectStyle>
+          <a:effectLst/>
+        </a:effectStyle>
+        <a:effectStyle>
+          <a:effectLst/>
+        </a:effectStyle>
+        <a:effectStyle>
+          <a:effectLst>
+            <a:outerShdw blurRad="57150" dist="19050" dir="5400000" algn="ctr" rotWithShape="0">
+              <a:srgbClr val="000000">
+                <a:alpha val="63000"/>
+              </a:srgbClr>
+            </a:outerShdw>
+          </a:effectLst>
+        </a:effectStyle>
+      </a:effectStyleLst>
+      <a:bgFillStyleLst>
+        <a:solidFill>
+          <a:schemeClr val="phClr"/>
+        </a:solidFill>
+        <a:solidFill>
+          <a:schemeClr val="phClr">
+            <a:tint val="95000"/>
+            <a:satMod val="170000"/>
+          </a:schemeClr>
+        </a:solidFill>
+        <a:gradFill rotWithShape="1">
+          <a:gsLst>
+            <a:gs pos="0">
+              <a:schemeClr val="phClr">
+                <a:tint val="93000"/>
+                <a:satMod val="150000"/>
+                <a:shade val="98000"/>
+                <a:lumMod val="102000"/>
+              </a:schemeClr>
+            </a:gs>
+            <a:gs pos="50000">
+              <a:schemeClr val="phClr">
+                <a:tint val="98000"/>
+                <a:satMod val="130000"/>
+                <a:shade val="90000"/>
+                <a:lumMod val="103000"/>
+              </a:schemeClr>
+            </a:gs>
+            <a:gs pos="100000">
+              <a:schemeClr val="phClr">
+                <a:shade val="63000"/>
+                <a:satMod val="120000"/>
+              </a:schemeClr>
+            </a:gs>
+          </a:gsLst>
+          <a:lin ang="5400000" scaled="0"/>
+        </a:gradFill>
+      </a:bgFillStyleLst>
+    </a:fmtScheme>
+  </a:themeElements>
+  <a:objectDefaults/>
+  <a:extraClrSchemeLst/>
+  <a:extLst>
+    <a:ext uri="{05A4C25C-085E-4340-85A3-A5531E510DB2}">
+      <thm15:themeFamily xmlns:thm15="http://schemas.microsoft.com/office/thememl/2012/main" name="Office Theme" id="{62F939B6-93AF-4DB8-9C6B-D6C7DFDC589F}" vid="{4A3C46E8-61CC-4603-A589-7422A47A8E4A}"/>
+    </a:ext>
+  </a:extLst>
+</a:theme>
 </file>
</xml_diff>